<commit_message>
Cleanup, minor edits, $TODOs
</commit_message>
<xml_diff>
--- a/msteams-platform/assets/images/task-module/Task Module Images.pptx
+++ b/msteams-platform/assets/images/task-module/Task Module Images.pptx
@@ -260,7 +260,7 @@
           <a:p>
             <a:fld id="{A7440465-2392-4494-A816-244CB43AFC7C}" type="datetimeFigureOut">
               <a:rPr lang="en-US" smtClean="0"/>
-              <a:t>8/30/2018</a:t>
+              <a:t>9/5/2018</a:t>
             </a:fld>
             <a:endParaRPr lang="en-US"/>
           </a:p>
@@ -458,7 +458,7 @@
           <a:p>
             <a:fld id="{A7440465-2392-4494-A816-244CB43AFC7C}" type="datetimeFigureOut">
               <a:rPr lang="en-US" smtClean="0"/>
-              <a:t>8/30/2018</a:t>
+              <a:t>9/5/2018</a:t>
             </a:fld>
             <a:endParaRPr lang="en-US"/>
           </a:p>
@@ -666,7 +666,7 @@
           <a:p>
             <a:fld id="{A7440465-2392-4494-A816-244CB43AFC7C}" type="datetimeFigureOut">
               <a:rPr lang="en-US" smtClean="0"/>
-              <a:t>8/30/2018</a:t>
+              <a:t>9/5/2018</a:t>
             </a:fld>
             <a:endParaRPr lang="en-US"/>
           </a:p>
@@ -864,7 +864,7 @@
           <a:p>
             <a:fld id="{A7440465-2392-4494-A816-244CB43AFC7C}" type="datetimeFigureOut">
               <a:rPr lang="en-US" smtClean="0"/>
-              <a:t>8/30/2018</a:t>
+              <a:t>9/5/2018</a:t>
             </a:fld>
             <a:endParaRPr lang="en-US"/>
           </a:p>
@@ -1139,7 +1139,7 @@
           <a:p>
             <a:fld id="{A7440465-2392-4494-A816-244CB43AFC7C}" type="datetimeFigureOut">
               <a:rPr lang="en-US" smtClean="0"/>
-              <a:t>8/30/2018</a:t>
+              <a:t>9/5/2018</a:t>
             </a:fld>
             <a:endParaRPr lang="en-US"/>
           </a:p>
@@ -1404,7 +1404,7 @@
           <a:p>
             <a:fld id="{A7440465-2392-4494-A816-244CB43AFC7C}" type="datetimeFigureOut">
               <a:rPr lang="en-US" smtClean="0"/>
-              <a:t>8/30/2018</a:t>
+              <a:t>9/5/2018</a:t>
             </a:fld>
             <a:endParaRPr lang="en-US"/>
           </a:p>
@@ -1816,7 +1816,7 @@
           <a:p>
             <a:fld id="{A7440465-2392-4494-A816-244CB43AFC7C}" type="datetimeFigureOut">
               <a:rPr lang="en-US" smtClean="0"/>
-              <a:t>8/30/2018</a:t>
+              <a:t>9/5/2018</a:t>
             </a:fld>
             <a:endParaRPr lang="en-US"/>
           </a:p>
@@ -1957,7 +1957,7 @@
           <a:p>
             <a:fld id="{A7440465-2392-4494-A816-244CB43AFC7C}" type="datetimeFigureOut">
               <a:rPr lang="en-US" smtClean="0"/>
-              <a:t>8/30/2018</a:t>
+              <a:t>9/5/2018</a:t>
             </a:fld>
             <a:endParaRPr lang="en-US"/>
           </a:p>
@@ -2070,7 +2070,7 @@
           <a:p>
             <a:fld id="{A7440465-2392-4494-A816-244CB43AFC7C}" type="datetimeFigureOut">
               <a:rPr lang="en-US" smtClean="0"/>
-              <a:t>8/30/2018</a:t>
+              <a:t>9/5/2018</a:t>
             </a:fld>
             <a:endParaRPr lang="en-US"/>
           </a:p>
@@ -2381,7 +2381,7 @@
           <a:p>
             <a:fld id="{A7440465-2392-4494-A816-244CB43AFC7C}" type="datetimeFigureOut">
               <a:rPr lang="en-US" smtClean="0"/>
-              <a:t>8/30/2018</a:t>
+              <a:t>9/5/2018</a:t>
             </a:fld>
             <a:endParaRPr lang="en-US"/>
           </a:p>
@@ -2669,7 +2669,7 @@
           <a:p>
             <a:fld id="{A7440465-2392-4494-A816-244CB43AFC7C}" type="datetimeFigureOut">
               <a:rPr lang="en-US" smtClean="0"/>
-              <a:t>8/30/2018</a:t>
+              <a:t>9/5/2018</a:t>
             </a:fld>
             <a:endParaRPr lang="en-US"/>
           </a:p>
@@ -2910,7 +2910,7 @@
           <a:p>
             <a:fld id="{A7440465-2392-4494-A816-244CB43AFC7C}" type="datetimeFigureOut">
               <a:rPr lang="en-US" smtClean="0"/>
-              <a:t>8/30/2018</a:t>
+              <a:t>9/5/2018</a:t>
             </a:fld>
             <a:endParaRPr lang="en-US"/>
           </a:p>
@@ -3951,7 +3951,7 @@
         <p:spPr>
           <a:xfrm>
             <a:off x="1291905" y="922789"/>
-            <a:ext cx="10335236" cy="4255896"/>
+            <a:ext cx="8510856" cy="4189985"/>
           </a:xfrm>
           <a:prstGeom prst="rect">
             <a:avLst/>
@@ -4050,8 +4050,8 @@
         </p:blipFill>
         <p:spPr>
           <a:xfrm>
-            <a:off x="4811435" y="2003964"/>
-            <a:ext cx="1085418" cy="1106934"/>
+            <a:off x="4427034" y="2214346"/>
+            <a:ext cx="627638" cy="640080"/>
           </a:xfrm>
           <a:prstGeom prst="rect">
             <a:avLst/>
@@ -4248,8 +4248,8 @@
         </p:blipFill>
         <p:spPr>
           <a:xfrm rot="10800000">
-            <a:off x="6005461" y="2221636"/>
-            <a:ext cx="671589" cy="671589"/>
+            <a:off x="5067167" y="2329196"/>
+            <a:ext cx="457200" cy="457200"/>
           </a:xfrm>
           <a:prstGeom prst="rect">
             <a:avLst/>
@@ -4287,8 +4287,8 @@
         </p:blipFill>
         <p:spPr>
           <a:xfrm rot="10800000">
-            <a:off x="4031238" y="2229951"/>
-            <a:ext cx="671589" cy="671589"/>
+            <a:off x="3933805" y="2328830"/>
+            <a:ext cx="457200" cy="457200"/>
           </a:xfrm>
           <a:prstGeom prst="rect">
             <a:avLst/>
@@ -4309,7 +4309,7 @@
         </p:nvGrpSpPr>
         <p:grpSpPr>
           <a:xfrm>
-            <a:off x="6785658" y="2003964"/>
+            <a:off x="5568491" y="2161061"/>
             <a:ext cx="1397240" cy="2535877"/>
             <a:chOff x="6928271" y="537657"/>
             <a:chExt cx="1397240" cy="2535877"/>
@@ -4596,47 +4596,12 @@
           </p:txBody>
         </p:sp>
       </p:grpSp>
-      <p:pic>
-        <p:nvPicPr>
-          <p:cNvPr id="25" name="Picture 24" descr="A screenshot of a cell phone&#10;&#10;Description generated with very high confidence">
-            <a:extLst>
-              <a:ext uri="{FF2B5EF4-FFF2-40B4-BE49-F238E27FC236}">
-                <a16:creationId xmlns:a16="http://schemas.microsoft.com/office/drawing/2014/main" id="{6A42B081-43E6-42DC-BDF2-A7D62707014E}"/>
-              </a:ext>
-            </a:extLst>
-          </p:cNvPr>
-          <p:cNvPicPr>
-            <a:picLocks noChangeAspect="1"/>
-          </p:cNvPicPr>
-          <p:nvPr/>
-        </p:nvPicPr>
-        <p:blipFill rotWithShape="1">
-          <a:blip r:embed="rId2">
-            <a:extLst>
-              <a:ext uri="{28A0092B-C50C-407E-A947-70E740481C1C}">
-                <a14:useLocalDpi xmlns:a14="http://schemas.microsoft.com/office/drawing/2010/main" val="0"/>
-              </a:ext>
-            </a:extLst>
-          </a:blip>
-          <a:srcRect l="11465" r="12816"/>
-          <a:stretch/>
-        </p:blipFill>
-        <p:spPr>
-          <a:xfrm>
-            <a:off x="9071703" y="1349004"/>
-            <a:ext cx="2341917" cy="2433484"/>
-          </a:xfrm>
-          <a:prstGeom prst="rect">
-            <a:avLst/>
-          </a:prstGeom>
-        </p:spPr>
-      </p:pic>
       <p:grpSp>
         <p:nvGrpSpPr>
-          <p:cNvPr id="40" name="Group 39">
-            <a:extLst>
-              <a:ext uri="{FF2B5EF4-FFF2-40B4-BE49-F238E27FC236}">
-                <a16:creationId xmlns:a16="http://schemas.microsoft.com/office/drawing/2014/main" id="{C085BB88-495E-40BD-93F8-1EF07A685735}"/>
+          <p:cNvPr id="2" name="Group 1">
+            <a:extLst>
+              <a:ext uri="{FF2B5EF4-FFF2-40B4-BE49-F238E27FC236}">
+                <a16:creationId xmlns:a16="http://schemas.microsoft.com/office/drawing/2014/main" id="{833B50CA-FE71-4625-834B-805AEF94C212}"/>
               </a:ext>
             </a:extLst>
           </p:cNvPr>
@@ -4645,18 +4610,53 @@
         </p:nvGrpSpPr>
         <p:grpSpPr>
           <a:xfrm>
-            <a:off x="9392692" y="1632256"/>
-            <a:ext cx="1870064" cy="2123513"/>
-            <a:chOff x="4278010" y="3880511"/>
-            <a:chExt cx="1870064" cy="2123513"/>
+            <a:off x="7238455" y="1569289"/>
+            <a:ext cx="2341917" cy="2433484"/>
+            <a:chOff x="7730472" y="1606799"/>
+            <a:chExt cx="2341917" cy="2433484"/>
           </a:xfrm>
         </p:grpSpPr>
+        <p:pic>
+          <p:nvPicPr>
+            <p:cNvPr id="25" name="Picture 24" descr="A screenshot of a cell phone&#10;&#10;Description generated with very high confidence">
+              <a:extLst>
+                <a:ext uri="{FF2B5EF4-FFF2-40B4-BE49-F238E27FC236}">
+                  <a16:creationId xmlns:a16="http://schemas.microsoft.com/office/drawing/2014/main" id="{6A42B081-43E6-42DC-BDF2-A7D62707014E}"/>
+                </a:ext>
+              </a:extLst>
+            </p:cNvPr>
+            <p:cNvPicPr>
+              <a:picLocks noChangeAspect="1"/>
+            </p:cNvPicPr>
+            <p:nvPr/>
+          </p:nvPicPr>
+          <p:blipFill rotWithShape="1">
+            <a:blip r:embed="rId2">
+              <a:extLst>
+                <a:ext uri="{28A0092B-C50C-407E-A947-70E740481C1C}">
+                  <a14:useLocalDpi xmlns:a14="http://schemas.microsoft.com/office/drawing/2010/main" val="0"/>
+                </a:ext>
+              </a:extLst>
+            </a:blip>
+            <a:srcRect l="11465" r="12816"/>
+            <a:stretch/>
+          </p:blipFill>
+          <p:spPr>
+            <a:xfrm>
+              <a:off x="7730472" y="1606799"/>
+              <a:ext cx="2341917" cy="2433484"/>
+            </a:xfrm>
+            <a:prstGeom prst="rect">
+              <a:avLst/>
+            </a:prstGeom>
+          </p:spPr>
+        </p:pic>
         <p:grpSp>
           <p:nvGrpSpPr>
-            <p:cNvPr id="34" name="Group 33">
+            <p:cNvPr id="40" name="Group 39">
               <a:extLst>
                 <a:ext uri="{FF2B5EF4-FFF2-40B4-BE49-F238E27FC236}">
-                  <a16:creationId xmlns:a16="http://schemas.microsoft.com/office/drawing/2014/main" id="{AA6C10F2-CB3E-4311-95BD-D19F95A9D6EA}"/>
+                  <a16:creationId xmlns:a16="http://schemas.microsoft.com/office/drawing/2014/main" id="{C085BB88-495E-40BD-93F8-1EF07A685735}"/>
                 </a:ext>
               </a:extLst>
             </p:cNvPr>
@@ -4665,18 +4665,125 @@
           </p:nvGrpSpPr>
           <p:grpSpPr>
             <a:xfrm>
-              <a:off x="4278010" y="3894993"/>
-              <a:ext cx="1870064" cy="2109031"/>
-              <a:chOff x="9416611" y="733922"/>
-              <a:chExt cx="1870064" cy="2109031"/>
+              <a:off x="8051461" y="1890051"/>
+              <a:ext cx="1870064" cy="2123513"/>
+              <a:chOff x="4278010" y="3880511"/>
+              <a:chExt cx="1870064" cy="2123513"/>
             </a:xfrm>
           </p:grpSpPr>
+          <p:grpSp>
+            <p:nvGrpSpPr>
+              <p:cNvPr id="34" name="Group 33">
+                <a:extLst>
+                  <a:ext uri="{FF2B5EF4-FFF2-40B4-BE49-F238E27FC236}">
+                    <a16:creationId xmlns:a16="http://schemas.microsoft.com/office/drawing/2014/main" id="{AA6C10F2-CB3E-4311-95BD-D19F95A9D6EA}"/>
+                  </a:ext>
+                </a:extLst>
+              </p:cNvPr>
+              <p:cNvGrpSpPr/>
+              <p:nvPr/>
+            </p:nvGrpSpPr>
+            <p:grpSpPr>
+              <a:xfrm>
+                <a:off x="4278010" y="3894993"/>
+                <a:ext cx="1870064" cy="2109031"/>
+                <a:chOff x="9416611" y="733922"/>
+                <a:chExt cx="1870064" cy="2109031"/>
+              </a:xfrm>
+            </p:grpSpPr>
+            <p:sp>
+              <p:nvSpPr>
+                <p:cNvPr id="35" name="Rectangle 34">
+                  <a:extLst>
+                    <a:ext uri="{FF2B5EF4-FFF2-40B4-BE49-F238E27FC236}">
+                      <a16:creationId xmlns:a16="http://schemas.microsoft.com/office/drawing/2014/main" id="{A5CFA70D-C7BA-4671-9207-F0E59E834818}"/>
+                    </a:ext>
+                  </a:extLst>
+                </p:cNvPr>
+                <p:cNvSpPr/>
+                <p:nvPr/>
+              </p:nvSpPr>
+              <p:spPr>
+                <a:xfrm>
+                  <a:off x="9416611" y="733922"/>
+                  <a:ext cx="1870064" cy="2109031"/>
+                </a:xfrm>
+                <a:prstGeom prst="rect">
+                  <a:avLst/>
+                </a:prstGeom>
+                <a:ln>
+                  <a:solidFill>
+                    <a:schemeClr val="bg2">
+                      <a:lumMod val="75000"/>
+                    </a:schemeClr>
+                  </a:solidFill>
+                </a:ln>
+              </p:spPr>
+              <p:style>
+                <a:lnRef idx="2">
+                  <a:schemeClr val="dk1"/>
+                </a:lnRef>
+                <a:fillRef idx="1">
+                  <a:schemeClr val="lt1"/>
+                </a:fillRef>
+                <a:effectRef idx="0">
+                  <a:schemeClr val="dk1"/>
+                </a:effectRef>
+                <a:fontRef idx="minor">
+                  <a:schemeClr val="dk1"/>
+                </a:fontRef>
+              </p:style>
+              <p:txBody>
+                <a:bodyPr rtlCol="0" anchor="ctr"/>
+                <a:lstStyle/>
+                <a:p>
+                  <a:pPr algn="ctr"/>
+                  <a:endParaRPr lang="en-US"/>
+                </a:p>
+              </p:txBody>
+            </p:sp>
+            <p:pic>
+              <p:nvPicPr>
+                <p:cNvPr id="36" name="Picture 35" descr="A screenshot of a cell phone&#10;&#10;Description generated with very high confidence">
+                  <a:extLst>
+                    <a:ext uri="{FF2B5EF4-FFF2-40B4-BE49-F238E27FC236}">
+                      <a16:creationId xmlns:a16="http://schemas.microsoft.com/office/drawing/2014/main" id="{02A2B661-2602-40F3-9EC4-D0698EA98E6B}"/>
+                    </a:ext>
+                  </a:extLst>
+                </p:cNvPr>
+                <p:cNvPicPr>
+                  <a:picLocks noChangeAspect="1"/>
+                </p:cNvPicPr>
+                <p:nvPr/>
+              </p:nvPicPr>
+              <p:blipFill rotWithShape="1">
+                <a:blip r:embed="rId2">
+                  <a:extLst>
+                    <a:ext uri="{28A0092B-C50C-407E-A947-70E740481C1C}">
+                      <a14:useLocalDpi xmlns:a14="http://schemas.microsoft.com/office/drawing/2010/main" val="0"/>
+                    </a:ext>
+                  </a:extLst>
+                </a:blip>
+                <a:srcRect l="11465" t="2699" r="82594" b="89601"/>
+                <a:stretch/>
+              </p:blipFill>
+              <p:spPr>
+                <a:xfrm>
+                  <a:off x="9460735" y="766500"/>
+                  <a:ext cx="179323" cy="182880"/>
+                </a:xfrm>
+                <a:prstGeom prst="rect">
+                  <a:avLst/>
+                </a:prstGeom>
+              </p:spPr>
+            </p:pic>
+          </p:grpSp>
           <p:sp>
             <p:nvSpPr>
-              <p:cNvPr id="35" name="Rectangle 34">
+              <p:cNvPr id="37" name="Rectangle 36">
                 <a:extLst>
                   <a:ext uri="{FF2B5EF4-FFF2-40B4-BE49-F238E27FC236}">
-                    <a16:creationId xmlns:a16="http://schemas.microsoft.com/office/drawing/2014/main" id="{A5CFA70D-C7BA-4671-9207-F0E59E834818}"/>
+                    <a16:creationId xmlns:a16="http://schemas.microsoft.com/office/drawing/2014/main" id="{F70A49A7-B04E-4B9A-A986-8C73F658FEBF}"/>
                   </a:ext>
                 </a:extLst>
               </p:cNvPr>
@@ -4685,8 +4792,8 @@
             </p:nvSpPr>
             <p:spPr>
               <a:xfrm>
-                <a:off x="9416611" y="733922"/>
-                <a:ext cx="1870064" cy="2109031"/>
+                <a:off x="4322134" y="4157510"/>
+                <a:ext cx="1773866" cy="1790333"/>
               </a:xfrm>
               <a:prstGeom prst="rect">
                 <a:avLst/>
@@ -4722,146 +4829,60 @@
               </a:p>
             </p:txBody>
           </p:sp>
-          <p:pic>
-            <p:nvPicPr>
-              <p:cNvPr id="36" name="Picture 35" descr="A screenshot of a cell phone&#10;&#10;Description generated with very high confidence">
+          <p:sp>
+            <p:nvSpPr>
+              <p:cNvPr id="39" name="TextBox 38">
                 <a:extLst>
                   <a:ext uri="{FF2B5EF4-FFF2-40B4-BE49-F238E27FC236}">
-                    <a16:creationId xmlns:a16="http://schemas.microsoft.com/office/drawing/2014/main" id="{02A2B661-2602-40F3-9EC4-D0698EA98E6B}"/>
+                    <a16:creationId xmlns:a16="http://schemas.microsoft.com/office/drawing/2014/main" id="{4313429F-9A34-434E-B54B-037BF5AFA9D7}"/>
                   </a:ext>
                 </a:extLst>
               </p:cNvPr>
-              <p:cNvPicPr>
-                <a:picLocks noChangeAspect="1"/>
-              </p:cNvPicPr>
+              <p:cNvSpPr txBox="1"/>
               <p:nvPr/>
-            </p:nvPicPr>
-            <p:blipFill rotWithShape="1">
-              <a:blip r:embed="rId2">
-                <a:extLst>
-                  <a:ext uri="{28A0092B-C50C-407E-A947-70E740481C1C}">
-                    <a14:useLocalDpi xmlns:a14="http://schemas.microsoft.com/office/drawing/2010/main" val="0"/>
-                  </a:ext>
-                </a:extLst>
-              </a:blip>
-              <a:srcRect l="11465" t="2699" r="82594" b="89601"/>
-              <a:stretch/>
-            </p:blipFill>
+            </p:nvSpPr>
             <p:spPr>
               <a:xfrm>
-                <a:off x="9460735" y="766500"/>
-                <a:ext cx="179323" cy="182880"/>
+                <a:off x="4439273" y="3880511"/>
+                <a:ext cx="1040670" cy="276999"/>
               </a:xfrm>
               <a:prstGeom prst="rect">
                 <a:avLst/>
               </a:prstGeom>
+              <a:noFill/>
             </p:spPr>
-          </p:pic>
-        </p:grpSp>
-        <p:sp>
-          <p:nvSpPr>
-            <p:cNvPr id="37" name="Rectangle 36">
-              <a:extLst>
-                <a:ext uri="{FF2B5EF4-FFF2-40B4-BE49-F238E27FC236}">
-                  <a16:creationId xmlns:a16="http://schemas.microsoft.com/office/drawing/2014/main" id="{F70A49A7-B04E-4B9A-A986-8C73F658FEBF}"/>
-                </a:ext>
-              </a:extLst>
-            </p:cNvPr>
-            <p:cNvSpPr/>
-            <p:nvPr/>
-          </p:nvSpPr>
-          <p:spPr>
-            <a:xfrm>
-              <a:off x="4322134" y="4157510"/>
-              <a:ext cx="1773866" cy="1790333"/>
-            </a:xfrm>
-            <a:prstGeom prst="rect">
-              <a:avLst/>
-            </a:prstGeom>
-            <a:ln>
-              <a:solidFill>
-                <a:schemeClr val="bg2">
-                  <a:lumMod val="75000"/>
-                </a:schemeClr>
-              </a:solidFill>
-            </a:ln>
-          </p:spPr>
-          <p:style>
-            <a:lnRef idx="2">
-              <a:schemeClr val="dk1"/>
-            </a:lnRef>
-            <a:fillRef idx="1">
-              <a:schemeClr val="lt1"/>
-            </a:fillRef>
-            <a:effectRef idx="0">
-              <a:schemeClr val="dk1"/>
-            </a:effectRef>
-            <a:fontRef idx="minor">
-              <a:schemeClr val="dk1"/>
-            </a:fontRef>
-          </p:style>
-          <p:txBody>
-            <a:bodyPr rtlCol="0" anchor="ctr"/>
-            <a:lstStyle/>
-            <a:p>
-              <a:pPr algn="ctr"/>
-              <a:endParaRPr lang="en-US"/>
-            </a:p>
-          </p:txBody>
-        </p:sp>
-        <p:sp>
-          <p:nvSpPr>
-            <p:cNvPr id="39" name="TextBox 38">
-              <a:extLst>
-                <a:ext uri="{FF2B5EF4-FFF2-40B4-BE49-F238E27FC236}">
-                  <a16:creationId xmlns:a16="http://schemas.microsoft.com/office/drawing/2014/main" id="{4313429F-9A34-434E-B54B-037BF5AFA9D7}"/>
-                </a:ext>
-              </a:extLst>
-            </p:cNvPr>
-            <p:cNvSpPr txBox="1"/>
-            <p:nvPr/>
-          </p:nvSpPr>
-          <p:spPr>
-            <a:xfrm>
-              <a:off x="4439273" y="3880511"/>
-              <a:ext cx="1040670" cy="276999"/>
-            </a:xfrm>
-            <a:prstGeom prst="rect">
-              <a:avLst/>
-            </a:prstGeom>
-            <a:noFill/>
-          </p:spPr>
-          <p:txBody>
-            <a:bodyPr wrap="none" rtlCol="0">
-              <a:spAutoFit/>
-            </a:bodyPr>
-            <a:lstStyle/>
-            <a:p>
-              <a:r>
-                <a:rPr lang="en-US" sz="600" b="1" dirty="0" err="1">
+            <p:txBody>
+              <a:bodyPr wrap="none" rtlCol="0">
+                <a:spAutoFit/>
+              </a:bodyPr>
+              <a:lstStyle/>
+              <a:p>
+                <a:r>
+                  <a:rPr lang="en-US" sz="600" b="1" dirty="0" err="1">
+                    <a:latin typeface="Segoe UI" panose="020B0502040204020203" pitchFamily="34" charset="0"/>
+                    <a:cs typeface="Segoe UI" panose="020B0502040204020203" pitchFamily="34" charset="0"/>
+                  </a:rPr>
+                  <a:t>Shopbot</a:t>
+                </a:r>
+                <a:endParaRPr lang="en-US" sz="600" b="1" dirty="0">
                   <a:latin typeface="Segoe UI" panose="020B0502040204020203" pitchFamily="34" charset="0"/>
                   <a:cs typeface="Segoe UI" panose="020B0502040204020203" pitchFamily="34" charset="0"/>
-                </a:rPr>
-                <a:t>Shopbot</a:t>
-              </a:r>
-              <a:endParaRPr lang="en-US" sz="600" b="1" dirty="0">
-                <a:latin typeface="Segoe UI" panose="020B0502040204020203" pitchFamily="34" charset="0"/>
-                <a:cs typeface="Segoe UI" panose="020B0502040204020203" pitchFamily="34" charset="0"/>
-              </a:endParaRPr>
-            </a:p>
-            <a:p>
-              <a:r>
-                <a:rPr lang="en-US" sz="600" dirty="0"/>
-                <a:t>Lorem ipsum arcus </a:t>
-              </a:r>
-              <a:r>
-                <a:rPr lang="en-US" sz="600" dirty="0" err="1"/>
-                <a:t>touchus</a:t>
-              </a:r>
-              <a:endParaRPr lang="en-US" sz="600" dirty="0"/>
-            </a:p>
-          </p:txBody>
-        </p:sp>
+                </a:endParaRPr>
+              </a:p>
+              <a:p>
+                <a:r>
+                  <a:rPr lang="en-US" sz="600" dirty="0"/>
+                  <a:t>Lorem ipsum arcus </a:t>
+                </a:r>
+                <a:r>
+                  <a:rPr lang="en-US" sz="600" dirty="0" err="1"/>
+                  <a:t>touchus</a:t>
+                </a:r>
+                <a:endParaRPr lang="en-US" sz="600" dirty="0"/>
+              </a:p>
+            </p:txBody>
+          </p:sp>
+        </p:grpSp>
       </p:grpSp>
       <p:pic>
         <p:nvPicPr>
@@ -4894,271 +4915,250 @@
         </p:blipFill>
         <p:spPr>
           <a:xfrm rot="10800000">
-            <a:off x="8291506" y="2229951"/>
-            <a:ext cx="671589" cy="671589"/>
+            <a:off x="7009855" y="2347959"/>
+            <a:ext cx="457200" cy="457200"/>
           </a:xfrm>
           <a:prstGeom prst="rect">
             <a:avLst/>
           </a:prstGeom>
         </p:spPr>
       </p:pic>
-      <p:grpSp>
-        <p:nvGrpSpPr>
-          <p:cNvPr id="46" name="Group 45">
-            <a:extLst>
-              <a:ext uri="{FF2B5EF4-FFF2-40B4-BE49-F238E27FC236}">
-                <a16:creationId xmlns:a16="http://schemas.microsoft.com/office/drawing/2014/main" id="{23D290EC-3508-4089-AD77-6939BF92E3B6}"/>
-              </a:ext>
-            </a:extLst>
-          </p:cNvPr>
-          <p:cNvGrpSpPr/>
+      <p:sp>
+        <p:nvSpPr>
+          <p:cNvPr id="42" name="Oval 41">
+            <a:extLst>
+              <a:ext uri="{FF2B5EF4-FFF2-40B4-BE49-F238E27FC236}">
+                <a16:creationId xmlns:a16="http://schemas.microsoft.com/office/drawing/2014/main" id="{3BC422CC-6F45-4E0F-939E-7D7805968BF3}"/>
+              </a:ext>
+            </a:extLst>
+          </p:cNvPr>
+          <p:cNvSpPr>
+            <a:spLocks noChangeAspect="1"/>
+          </p:cNvSpPr>
           <p:nvPr/>
-        </p:nvGrpSpPr>
-        <p:grpSpPr>
+        </p:nvSpPr>
+        <p:spPr>
           <a:xfrm>
-            <a:off x="2660231" y="1131171"/>
-            <a:ext cx="7754958" cy="182880"/>
-            <a:chOff x="2802844" y="426496"/>
-            <a:chExt cx="7754958" cy="182880"/>
+            <a:off x="2660231" y="1042682"/>
+            <a:ext cx="274320" cy="274320"/>
           </a:xfrm>
-        </p:grpSpPr>
-        <p:sp>
-          <p:nvSpPr>
-            <p:cNvPr id="42" name="Oval 41">
-              <a:extLst>
-                <a:ext uri="{FF2B5EF4-FFF2-40B4-BE49-F238E27FC236}">
-                  <a16:creationId xmlns:a16="http://schemas.microsoft.com/office/drawing/2014/main" id="{3BC422CC-6F45-4E0F-939E-7D7805968BF3}"/>
-                </a:ext>
-              </a:extLst>
-            </p:cNvPr>
-            <p:cNvSpPr>
-              <a:spLocks noChangeAspect="1"/>
-            </p:cNvSpPr>
-            <p:nvPr/>
-          </p:nvSpPr>
-          <p:spPr>
-            <a:xfrm>
-              <a:off x="2802844" y="426496"/>
-              <a:ext cx="182880" cy="182880"/>
-            </a:xfrm>
-            <a:prstGeom prst="ellipse">
-              <a:avLst/>
-            </a:prstGeom>
+          <a:prstGeom prst="ellipse">
+            <a:avLst/>
+          </a:prstGeom>
+          <a:solidFill>
+            <a:srgbClr val="5558AF"/>
+          </a:solidFill>
+          <a:ln>
             <a:solidFill>
               <a:srgbClr val="5558AF"/>
             </a:solidFill>
-            <a:ln>
-              <a:solidFill>
-                <a:srgbClr val="5558AF"/>
-              </a:solidFill>
-            </a:ln>
-          </p:spPr>
-          <p:style>
-            <a:lnRef idx="2">
-              <a:schemeClr val="accent1">
-                <a:shade val="50000"/>
-              </a:schemeClr>
-            </a:lnRef>
-            <a:fillRef idx="1">
-              <a:schemeClr val="accent1"/>
-            </a:fillRef>
-            <a:effectRef idx="0">
-              <a:schemeClr val="accent1"/>
-            </a:effectRef>
-            <a:fontRef idx="minor">
-              <a:schemeClr val="lt1"/>
-            </a:fontRef>
-          </p:style>
-          <p:txBody>
-            <a:bodyPr rtlCol="0" anchor="ctr"/>
-            <a:lstStyle/>
-            <a:p>
-              <a:pPr algn="ctr"/>
-              <a:r>
-                <a:rPr lang="en-US" sz="1300" dirty="0"/>
-                <a:t>1</a:t>
-              </a:r>
-            </a:p>
-          </p:txBody>
-        </p:sp>
-        <p:sp>
-          <p:nvSpPr>
-            <p:cNvPr id="43" name="Oval 42">
-              <a:extLst>
-                <a:ext uri="{FF2B5EF4-FFF2-40B4-BE49-F238E27FC236}">
-                  <a16:creationId xmlns:a16="http://schemas.microsoft.com/office/drawing/2014/main" id="{3FBEBF31-28A9-4672-A023-E5297DFC9133}"/>
-                </a:ext>
-              </a:extLst>
-            </p:cNvPr>
-            <p:cNvSpPr>
-              <a:spLocks noChangeAspect="1"/>
-            </p:cNvSpPr>
-            <p:nvPr/>
-          </p:nvSpPr>
-          <p:spPr>
-            <a:xfrm>
-              <a:off x="5405317" y="426496"/>
-              <a:ext cx="182880" cy="182880"/>
-            </a:xfrm>
-            <a:prstGeom prst="ellipse">
-              <a:avLst/>
-            </a:prstGeom>
+          </a:ln>
+        </p:spPr>
+        <p:style>
+          <a:lnRef idx="2">
+            <a:schemeClr val="accent1">
+              <a:shade val="50000"/>
+            </a:schemeClr>
+          </a:lnRef>
+          <a:fillRef idx="1">
+            <a:schemeClr val="accent1"/>
+          </a:fillRef>
+          <a:effectRef idx="0">
+            <a:schemeClr val="accent1"/>
+          </a:effectRef>
+          <a:fontRef idx="minor">
+            <a:schemeClr val="lt1"/>
+          </a:fontRef>
+        </p:style>
+        <p:txBody>
+          <a:bodyPr rtlCol="0" anchor="ctr"/>
+          <a:lstStyle/>
+          <a:p>
+            <a:pPr algn="ctr"/>
+            <a:r>
+              <a:rPr lang="en-US" sz="1600" dirty="0"/>
+              <a:t>1</a:t>
+            </a:r>
+          </a:p>
+        </p:txBody>
+      </p:sp>
+      <p:sp>
+        <p:nvSpPr>
+          <p:cNvPr id="43" name="Oval 42">
+            <a:extLst>
+              <a:ext uri="{FF2B5EF4-FFF2-40B4-BE49-F238E27FC236}">
+                <a16:creationId xmlns:a16="http://schemas.microsoft.com/office/drawing/2014/main" id="{3FBEBF31-28A9-4672-A023-E5297DFC9133}"/>
+              </a:ext>
+            </a:extLst>
+          </p:cNvPr>
+          <p:cNvSpPr>
+            <a:spLocks noChangeAspect="1"/>
+          </p:cNvSpPr>
+          <p:nvPr/>
+        </p:nvSpPr>
+        <p:spPr>
+          <a:xfrm>
+            <a:off x="4644807" y="1042682"/>
+            <a:ext cx="274320" cy="274320"/>
+          </a:xfrm>
+          <a:prstGeom prst="ellipse">
+            <a:avLst/>
+          </a:prstGeom>
+          <a:solidFill>
+            <a:srgbClr val="5558AF"/>
+          </a:solidFill>
+          <a:ln>
             <a:solidFill>
               <a:srgbClr val="5558AF"/>
             </a:solidFill>
-            <a:ln>
-              <a:solidFill>
-                <a:srgbClr val="5558AF"/>
-              </a:solidFill>
-            </a:ln>
-          </p:spPr>
-          <p:style>
-            <a:lnRef idx="2">
-              <a:schemeClr val="accent1">
-                <a:shade val="50000"/>
-              </a:schemeClr>
-            </a:lnRef>
-            <a:fillRef idx="1">
-              <a:schemeClr val="accent1"/>
-            </a:fillRef>
-            <a:effectRef idx="0">
-              <a:schemeClr val="accent1"/>
-            </a:effectRef>
-            <a:fontRef idx="minor">
-              <a:schemeClr val="lt1"/>
-            </a:fontRef>
-          </p:style>
-          <p:txBody>
-            <a:bodyPr rtlCol="0" anchor="ctr"/>
-            <a:lstStyle/>
-            <a:p>
-              <a:pPr algn="ctr"/>
-              <a:r>
-                <a:rPr lang="en-US" sz="1300" dirty="0"/>
-                <a:t>2</a:t>
-              </a:r>
-            </a:p>
-          </p:txBody>
-        </p:sp>
-        <p:sp>
-          <p:nvSpPr>
-            <p:cNvPr id="44" name="Oval 43">
-              <a:extLst>
-                <a:ext uri="{FF2B5EF4-FFF2-40B4-BE49-F238E27FC236}">
-                  <a16:creationId xmlns:a16="http://schemas.microsoft.com/office/drawing/2014/main" id="{B938B468-78B6-4C22-B370-BA6E68EAF689}"/>
-                </a:ext>
-              </a:extLst>
-            </p:cNvPr>
-            <p:cNvSpPr>
-              <a:spLocks noChangeAspect="1"/>
-            </p:cNvSpPr>
-            <p:nvPr/>
-          </p:nvSpPr>
-          <p:spPr>
-            <a:xfrm>
-              <a:off x="7535451" y="426496"/>
-              <a:ext cx="182880" cy="182880"/>
-            </a:xfrm>
-            <a:prstGeom prst="ellipse">
-              <a:avLst/>
-            </a:prstGeom>
+          </a:ln>
+        </p:spPr>
+        <p:style>
+          <a:lnRef idx="2">
+            <a:schemeClr val="accent1">
+              <a:shade val="50000"/>
+            </a:schemeClr>
+          </a:lnRef>
+          <a:fillRef idx="1">
+            <a:schemeClr val="accent1"/>
+          </a:fillRef>
+          <a:effectRef idx="0">
+            <a:schemeClr val="accent1"/>
+          </a:effectRef>
+          <a:fontRef idx="minor">
+            <a:schemeClr val="lt1"/>
+          </a:fontRef>
+        </p:style>
+        <p:txBody>
+          <a:bodyPr rtlCol="0" anchor="ctr"/>
+          <a:lstStyle/>
+          <a:p>
+            <a:pPr algn="ctr"/>
+            <a:r>
+              <a:rPr lang="en-US" sz="1600" dirty="0"/>
+              <a:t>2</a:t>
+            </a:r>
+          </a:p>
+        </p:txBody>
+      </p:sp>
+      <p:sp>
+        <p:nvSpPr>
+          <p:cNvPr id="44" name="Oval 43">
+            <a:extLst>
+              <a:ext uri="{FF2B5EF4-FFF2-40B4-BE49-F238E27FC236}">
+                <a16:creationId xmlns:a16="http://schemas.microsoft.com/office/drawing/2014/main" id="{B938B468-78B6-4C22-B370-BA6E68EAF689}"/>
+              </a:ext>
+            </a:extLst>
+          </p:cNvPr>
+          <p:cNvSpPr>
+            <a:spLocks noChangeAspect="1"/>
+          </p:cNvSpPr>
+          <p:nvPr/>
+        </p:nvSpPr>
+        <p:spPr>
+          <a:xfrm>
+            <a:off x="6175671" y="1042682"/>
+            <a:ext cx="274320" cy="274320"/>
+          </a:xfrm>
+          <a:prstGeom prst="ellipse">
+            <a:avLst/>
+          </a:prstGeom>
+          <a:solidFill>
+            <a:srgbClr val="5558AF"/>
+          </a:solidFill>
+          <a:ln>
             <a:solidFill>
               <a:srgbClr val="5558AF"/>
             </a:solidFill>
-            <a:ln>
-              <a:solidFill>
-                <a:srgbClr val="5558AF"/>
-              </a:solidFill>
-            </a:ln>
-          </p:spPr>
-          <p:style>
-            <a:lnRef idx="2">
-              <a:schemeClr val="accent1">
-                <a:shade val="50000"/>
-              </a:schemeClr>
-            </a:lnRef>
-            <a:fillRef idx="1">
-              <a:schemeClr val="accent1"/>
-            </a:fillRef>
-            <a:effectRef idx="0">
-              <a:schemeClr val="accent1"/>
-            </a:effectRef>
-            <a:fontRef idx="minor">
-              <a:schemeClr val="lt1"/>
-            </a:fontRef>
-          </p:style>
-          <p:txBody>
-            <a:bodyPr rtlCol="0" anchor="ctr"/>
-            <a:lstStyle/>
-            <a:p>
-              <a:pPr algn="ctr"/>
-              <a:r>
-                <a:rPr lang="en-US" sz="1300" dirty="0"/>
-                <a:t>3</a:t>
-              </a:r>
-            </a:p>
-          </p:txBody>
-        </p:sp>
-        <p:sp>
-          <p:nvSpPr>
-            <p:cNvPr id="45" name="Oval 44">
-              <a:extLst>
-                <a:ext uri="{FF2B5EF4-FFF2-40B4-BE49-F238E27FC236}">
-                  <a16:creationId xmlns:a16="http://schemas.microsoft.com/office/drawing/2014/main" id="{AF6D66EA-27F4-41E7-B861-03C44E2088BD}"/>
-                </a:ext>
-              </a:extLst>
-            </p:cNvPr>
-            <p:cNvSpPr>
-              <a:spLocks noChangeAspect="1"/>
-            </p:cNvSpPr>
-            <p:nvPr/>
-          </p:nvSpPr>
-          <p:spPr>
-            <a:xfrm>
-              <a:off x="10374922" y="426496"/>
-              <a:ext cx="182880" cy="182880"/>
-            </a:xfrm>
-            <a:prstGeom prst="ellipse">
-              <a:avLst/>
-            </a:prstGeom>
+          </a:ln>
+        </p:spPr>
+        <p:style>
+          <a:lnRef idx="2">
+            <a:schemeClr val="accent1">
+              <a:shade val="50000"/>
+            </a:schemeClr>
+          </a:lnRef>
+          <a:fillRef idx="1">
+            <a:schemeClr val="accent1"/>
+          </a:fillRef>
+          <a:effectRef idx="0">
+            <a:schemeClr val="accent1"/>
+          </a:effectRef>
+          <a:fontRef idx="minor">
+            <a:schemeClr val="lt1"/>
+          </a:fontRef>
+        </p:style>
+        <p:txBody>
+          <a:bodyPr rtlCol="0" anchor="ctr"/>
+          <a:lstStyle/>
+          <a:p>
+            <a:pPr algn="ctr"/>
+            <a:r>
+              <a:rPr lang="en-US" sz="1600" dirty="0"/>
+              <a:t>3</a:t>
+            </a:r>
+          </a:p>
+        </p:txBody>
+      </p:sp>
+      <p:sp>
+        <p:nvSpPr>
+          <p:cNvPr id="45" name="Oval 44">
+            <a:extLst>
+              <a:ext uri="{FF2B5EF4-FFF2-40B4-BE49-F238E27FC236}">
+                <a16:creationId xmlns:a16="http://schemas.microsoft.com/office/drawing/2014/main" id="{AF6D66EA-27F4-41E7-B861-03C44E2088BD}"/>
+              </a:ext>
+            </a:extLst>
+          </p:cNvPr>
+          <p:cNvSpPr>
+            <a:spLocks noChangeAspect="1"/>
+          </p:cNvSpPr>
+          <p:nvPr/>
+        </p:nvSpPr>
+        <p:spPr>
+          <a:xfrm>
+            <a:off x="8399061" y="1042682"/>
+            <a:ext cx="274320" cy="274320"/>
+          </a:xfrm>
+          <a:prstGeom prst="ellipse">
+            <a:avLst/>
+          </a:prstGeom>
+          <a:solidFill>
+            <a:srgbClr val="5558AF"/>
+          </a:solidFill>
+          <a:ln>
             <a:solidFill>
               <a:srgbClr val="5558AF"/>
             </a:solidFill>
-            <a:ln>
-              <a:solidFill>
-                <a:srgbClr val="5558AF"/>
-              </a:solidFill>
-            </a:ln>
-          </p:spPr>
-          <p:style>
-            <a:lnRef idx="2">
-              <a:schemeClr val="accent1">
-                <a:shade val="50000"/>
-              </a:schemeClr>
-            </a:lnRef>
-            <a:fillRef idx="1">
-              <a:schemeClr val="accent1"/>
-            </a:fillRef>
-            <a:effectRef idx="0">
-              <a:schemeClr val="accent1"/>
-            </a:effectRef>
-            <a:fontRef idx="minor">
-              <a:schemeClr val="lt1"/>
-            </a:fontRef>
-          </p:style>
-          <p:txBody>
-            <a:bodyPr rtlCol="0" anchor="ctr"/>
-            <a:lstStyle/>
-            <a:p>
-              <a:pPr algn="ctr"/>
-              <a:r>
-                <a:rPr lang="en-US" sz="1300" dirty="0"/>
-                <a:t>4</a:t>
-              </a:r>
-            </a:p>
-          </p:txBody>
-        </p:sp>
-      </p:grpSp>
+          </a:ln>
+        </p:spPr>
+        <p:style>
+          <a:lnRef idx="2">
+            <a:schemeClr val="accent1">
+              <a:shade val="50000"/>
+            </a:schemeClr>
+          </a:lnRef>
+          <a:fillRef idx="1">
+            <a:schemeClr val="accent1"/>
+          </a:fillRef>
+          <a:effectRef idx="0">
+            <a:schemeClr val="accent1"/>
+          </a:effectRef>
+          <a:fontRef idx="minor">
+            <a:schemeClr val="lt1"/>
+          </a:fontRef>
+        </p:style>
+        <p:txBody>
+          <a:bodyPr rtlCol="0" anchor="ctr"/>
+          <a:lstStyle/>
+          <a:p>
+            <a:pPr algn="ctr"/>
+            <a:r>
+              <a:rPr lang="en-US" sz="1600" dirty="0"/>
+              <a:t>4</a:t>
+            </a:r>
+          </a:p>
+        </p:txBody>
+      </p:sp>
     </p:spTree>
     <p:extLst>
       <p:ext uri="{BB962C8B-B14F-4D97-AF65-F5344CB8AC3E}">

</xml_diff>

<commit_message>
Fixed erroneous task/fetch content, updated C# source, minor cleanup
</commit_message>
<xml_diff>
--- a/msteams-platform/assets/images/task-module/Task Module Images.pptx
+++ b/msteams-platform/assets/images/task-module/Task Module Images.pptx
@@ -260,7 +260,7 @@
           <a:p>
             <a:fld id="{A7440465-2392-4494-A816-244CB43AFC7C}" type="datetimeFigureOut">
               <a:rPr lang="en-US" smtClean="0"/>
-              <a:t>9/5/2018</a:t>
+              <a:t>9/28/2018</a:t>
             </a:fld>
             <a:endParaRPr lang="en-US"/>
           </a:p>
@@ -458,7 +458,7 @@
           <a:p>
             <a:fld id="{A7440465-2392-4494-A816-244CB43AFC7C}" type="datetimeFigureOut">
               <a:rPr lang="en-US" smtClean="0"/>
-              <a:t>9/5/2018</a:t>
+              <a:t>9/28/2018</a:t>
             </a:fld>
             <a:endParaRPr lang="en-US"/>
           </a:p>
@@ -666,7 +666,7 @@
           <a:p>
             <a:fld id="{A7440465-2392-4494-A816-244CB43AFC7C}" type="datetimeFigureOut">
               <a:rPr lang="en-US" smtClean="0"/>
-              <a:t>9/5/2018</a:t>
+              <a:t>9/28/2018</a:t>
             </a:fld>
             <a:endParaRPr lang="en-US"/>
           </a:p>
@@ -864,7 +864,7 @@
           <a:p>
             <a:fld id="{A7440465-2392-4494-A816-244CB43AFC7C}" type="datetimeFigureOut">
               <a:rPr lang="en-US" smtClean="0"/>
-              <a:t>9/5/2018</a:t>
+              <a:t>9/28/2018</a:t>
             </a:fld>
             <a:endParaRPr lang="en-US"/>
           </a:p>
@@ -1139,7 +1139,7 @@
           <a:p>
             <a:fld id="{A7440465-2392-4494-A816-244CB43AFC7C}" type="datetimeFigureOut">
               <a:rPr lang="en-US" smtClean="0"/>
-              <a:t>9/5/2018</a:t>
+              <a:t>9/28/2018</a:t>
             </a:fld>
             <a:endParaRPr lang="en-US"/>
           </a:p>
@@ -1404,7 +1404,7 @@
           <a:p>
             <a:fld id="{A7440465-2392-4494-A816-244CB43AFC7C}" type="datetimeFigureOut">
               <a:rPr lang="en-US" smtClean="0"/>
-              <a:t>9/5/2018</a:t>
+              <a:t>9/28/2018</a:t>
             </a:fld>
             <a:endParaRPr lang="en-US"/>
           </a:p>
@@ -1816,7 +1816,7 @@
           <a:p>
             <a:fld id="{A7440465-2392-4494-A816-244CB43AFC7C}" type="datetimeFigureOut">
               <a:rPr lang="en-US" smtClean="0"/>
-              <a:t>9/5/2018</a:t>
+              <a:t>9/28/2018</a:t>
             </a:fld>
             <a:endParaRPr lang="en-US"/>
           </a:p>
@@ -1957,7 +1957,7 @@
           <a:p>
             <a:fld id="{A7440465-2392-4494-A816-244CB43AFC7C}" type="datetimeFigureOut">
               <a:rPr lang="en-US" smtClean="0"/>
-              <a:t>9/5/2018</a:t>
+              <a:t>9/28/2018</a:t>
             </a:fld>
             <a:endParaRPr lang="en-US"/>
           </a:p>
@@ -2070,7 +2070,7 @@
           <a:p>
             <a:fld id="{A7440465-2392-4494-A816-244CB43AFC7C}" type="datetimeFigureOut">
               <a:rPr lang="en-US" smtClean="0"/>
-              <a:t>9/5/2018</a:t>
+              <a:t>9/28/2018</a:t>
             </a:fld>
             <a:endParaRPr lang="en-US"/>
           </a:p>
@@ -2381,7 +2381,7 @@
           <a:p>
             <a:fld id="{A7440465-2392-4494-A816-244CB43AFC7C}" type="datetimeFigureOut">
               <a:rPr lang="en-US" smtClean="0"/>
-              <a:t>9/5/2018</a:t>
+              <a:t>9/28/2018</a:t>
             </a:fld>
             <a:endParaRPr lang="en-US"/>
           </a:p>
@@ -2669,7 +2669,7 @@
           <a:p>
             <a:fld id="{A7440465-2392-4494-A816-244CB43AFC7C}" type="datetimeFigureOut">
               <a:rPr lang="en-US" smtClean="0"/>
-              <a:t>9/5/2018</a:t>
+              <a:t>9/28/2018</a:t>
             </a:fld>
             <a:endParaRPr lang="en-US"/>
           </a:p>
@@ -2910,7 +2910,7 @@
           <a:p>
             <a:fld id="{A7440465-2392-4494-A816-244CB43AFC7C}" type="datetimeFigureOut">
               <a:rPr lang="en-US" smtClean="0"/>
-              <a:t>9/5/2018</a:t>
+              <a:t>9/28/2018</a:t>
             </a:fld>
             <a:endParaRPr lang="en-US"/>
           </a:p>
@@ -4102,7 +4102,7 @@
           </a:fontRef>
         </p:style>
         <p:txBody>
-          <a:bodyPr wrap="square" rtlCol="0">
+          <a:bodyPr wrap="square" lIns="45720" rIns="45720" rtlCol="0">
             <a:spAutoFit/>
           </a:bodyPr>
           <a:lstStyle/>
@@ -4297,10 +4297,10 @@
       </p:pic>
       <p:grpSp>
         <p:nvGrpSpPr>
-          <p:cNvPr id="28" name="Group 27">
-            <a:extLst>
-              <a:ext uri="{FF2B5EF4-FFF2-40B4-BE49-F238E27FC236}">
-                <a16:creationId xmlns:a16="http://schemas.microsoft.com/office/drawing/2014/main" id="{E4B12A82-C5CA-485B-9B20-FA00D3CC56F4}"/>
+          <p:cNvPr id="23" name="Group 22">
+            <a:extLst>
+              <a:ext uri="{FF2B5EF4-FFF2-40B4-BE49-F238E27FC236}">
+                <a16:creationId xmlns:a16="http://schemas.microsoft.com/office/drawing/2014/main" id="{2347E812-0894-431E-B3DB-9C4298A510F8}"/>
               </a:ext>
             </a:extLst>
           </p:cNvPr>
@@ -4309,18 +4309,61 @@
         </p:nvGrpSpPr>
         <p:grpSpPr>
           <a:xfrm>
-            <a:off x="5568491" y="2161061"/>
-            <a:ext cx="1397240" cy="2535877"/>
-            <a:chOff x="6928271" y="537657"/>
-            <a:chExt cx="1397240" cy="2535877"/>
+            <a:off x="6474691" y="3452439"/>
+            <a:ext cx="867006" cy="1502402"/>
+            <a:chOff x="5172460" y="4140199"/>
+            <a:chExt cx="867006" cy="1502402"/>
           </a:xfrm>
         </p:grpSpPr>
+        <p:sp>
+          <p:nvSpPr>
+            <p:cNvPr id="17" name="TextBox 16">
+              <a:extLst>
+                <a:ext uri="{FF2B5EF4-FFF2-40B4-BE49-F238E27FC236}">
+                  <a16:creationId xmlns:a16="http://schemas.microsoft.com/office/drawing/2014/main" id="{184802C8-9C0F-46A4-B2A6-EB11FCBCF1D1}"/>
+                </a:ext>
+              </a:extLst>
+            </p:cNvPr>
+            <p:cNvSpPr txBox="1"/>
+            <p:nvPr/>
+          </p:nvSpPr>
+          <p:spPr>
+            <a:xfrm>
+              <a:off x="5233906" y="5211714"/>
+              <a:ext cx="744114" cy="430887"/>
+            </a:xfrm>
+            <a:prstGeom prst="rect">
+              <a:avLst/>
+            </a:prstGeom>
+            <a:noFill/>
+          </p:spPr>
+          <p:txBody>
+            <a:bodyPr wrap="none" rtlCol="0">
+              <a:spAutoFit/>
+            </a:bodyPr>
+            <a:lstStyle/>
+            <a:p>
+              <a:pPr algn="ctr"/>
+              <a:r>
+                <a:rPr lang="en-US" sz="1100" b="1" dirty="0"/>
+                <a:t>HTTP</a:t>
+              </a:r>
+            </a:p>
+            <a:p>
+              <a:pPr algn="ctr"/>
+              <a:r>
+                <a:rPr lang="en-US" sz="1100" b="1" dirty="0"/>
+                <a:t>Response</a:t>
+              </a:r>
+            </a:p>
+          </p:txBody>
+        </p:sp>
         <p:grpSp>
           <p:nvGrpSpPr>
-            <p:cNvPr id="23" name="Group 22">
+            <p:cNvPr id="19" name="Group 18">
               <a:extLst>
                 <a:ext uri="{FF2B5EF4-FFF2-40B4-BE49-F238E27FC236}">
-                  <a16:creationId xmlns:a16="http://schemas.microsoft.com/office/drawing/2014/main" id="{2347E812-0894-431E-B3DB-9C4298A510F8}"/>
+                  <a16:creationId xmlns:a16="http://schemas.microsoft.com/office/drawing/2014/main" id="{5FF23D1D-84F1-4E59-8BD1-2AE31795BD0E}"/>
                 </a:ext>
               </a:extLst>
             </p:cNvPr>
@@ -4329,18 +4372,56 @@
           </p:nvGrpSpPr>
           <p:grpSpPr>
             <a:xfrm>
-              <a:off x="7193388" y="1571132"/>
-              <a:ext cx="867006" cy="1502402"/>
-              <a:chOff x="5172460" y="4140199"/>
-              <a:chExt cx="867006" cy="1502402"/>
+              <a:off x="5172460" y="4140199"/>
+              <a:ext cx="867006" cy="1117388"/>
+              <a:chOff x="5769559" y="3519524"/>
+              <a:chExt cx="892674" cy="1132520"/>
             </a:xfrm>
           </p:grpSpPr>
+          <p:pic>
+            <p:nvPicPr>
+              <p:cNvPr id="3" name="Graphic 2" descr="Paper">
+                <a:extLst>
+                  <a:ext uri="{FF2B5EF4-FFF2-40B4-BE49-F238E27FC236}">
+                    <a16:creationId xmlns:a16="http://schemas.microsoft.com/office/drawing/2014/main" id="{57F09E79-2329-450F-B543-2C70D4404026}"/>
+                  </a:ext>
+                </a:extLst>
+              </p:cNvPr>
+              <p:cNvPicPr>
+                <a:picLocks noChangeAspect="1"/>
+              </p:cNvPicPr>
+              <p:nvPr/>
+            </p:nvPicPr>
+            <p:blipFill rotWithShape="1">
+              <a:blip r:embed="rId5">
+                <a:extLst>
+                  <a:ext uri="{28A0092B-C50C-407E-A947-70E740481C1C}">
+                    <a14:useLocalDpi xmlns:a14="http://schemas.microsoft.com/office/drawing/2010/main" val="0"/>
+                  </a:ext>
+                  <a:ext uri="{96DAC541-7B7A-43D3-8B79-37D633B846F1}">
+                    <asvg:svgBlip xmlns:asvg="http://schemas.microsoft.com/office/drawing/2016/SVG/main" r:embed="rId6"/>
+                  </a:ext>
+                </a:extLst>
+              </a:blip>
+              <a:srcRect l="14474" t="5386" r="15477" b="5745"/>
+              <a:stretch/>
+            </p:blipFill>
+            <p:spPr>
+              <a:xfrm>
+                <a:off x="5769559" y="3519524"/>
+                <a:ext cx="892674" cy="1132520"/>
+              </a:xfrm>
+              <a:prstGeom prst="rect">
+                <a:avLst/>
+              </a:prstGeom>
+            </p:spPr>
+          </p:pic>
           <p:sp>
             <p:nvSpPr>
-              <p:cNvPr id="17" name="TextBox 16">
+              <p:cNvPr id="18" name="TextBox 17">
                 <a:extLst>
                   <a:ext uri="{FF2B5EF4-FFF2-40B4-BE49-F238E27FC236}">
-                    <a16:creationId xmlns:a16="http://schemas.microsoft.com/office/drawing/2014/main" id="{184802C8-9C0F-46A4-B2A6-EB11FCBCF1D1}"/>
+                    <a16:creationId xmlns:a16="http://schemas.microsoft.com/office/drawing/2014/main" id="{849D081C-36D1-4319-8021-9877B7B383FE}"/>
                   </a:ext>
                 </a:extLst>
               </p:cNvPr>
@@ -4349,8 +4430,8 @@
             </p:nvSpPr>
             <p:spPr>
               <a:xfrm>
-                <a:off x="5233906" y="5211714"/>
-                <a:ext cx="744114" cy="430887"/>
+                <a:off x="5933607" y="3901326"/>
+                <a:ext cx="564578" cy="646331"/>
               </a:xfrm>
               <a:prstGeom prst="rect">
                 <a:avLst/>
@@ -4365,236 +4446,24 @@
               <a:p>
                 <a:pPr algn="ctr"/>
                 <a:r>
-                  <a:rPr lang="en-US" sz="1100" b="1" dirty="0"/>
-                  <a:t>HTTP</a:t>
+                  <a:rPr lang="en-US" dirty="0">
+                    <a:latin typeface="Consolas" panose="020B0609020204030204" pitchFamily="49" charset="0"/>
+                  </a:rPr>
+                  <a:t>200</a:t>
                 </a:r>
               </a:p>
               <a:p>
                 <a:pPr algn="ctr"/>
                 <a:r>
-                  <a:rPr lang="en-US" sz="1100" b="1" dirty="0"/>
-                  <a:t>Response</a:t>
+                  <a:rPr lang="en-US" dirty="0">
+                    <a:latin typeface="Consolas" panose="020B0609020204030204" pitchFamily="49" charset="0"/>
+                  </a:rPr>
+                  <a:t>OK</a:t>
                 </a:r>
               </a:p>
             </p:txBody>
           </p:sp>
-          <p:grpSp>
-            <p:nvGrpSpPr>
-              <p:cNvPr id="19" name="Group 18">
-                <a:extLst>
-                  <a:ext uri="{FF2B5EF4-FFF2-40B4-BE49-F238E27FC236}">
-                    <a16:creationId xmlns:a16="http://schemas.microsoft.com/office/drawing/2014/main" id="{5FF23D1D-84F1-4E59-8BD1-2AE31795BD0E}"/>
-                  </a:ext>
-                </a:extLst>
-              </p:cNvPr>
-              <p:cNvGrpSpPr/>
-              <p:nvPr/>
-            </p:nvGrpSpPr>
-            <p:grpSpPr>
-              <a:xfrm>
-                <a:off x="5172460" y="4140199"/>
-                <a:ext cx="867006" cy="1117388"/>
-                <a:chOff x="5769559" y="3519524"/>
-                <a:chExt cx="892674" cy="1132520"/>
-              </a:xfrm>
-            </p:grpSpPr>
-            <p:pic>
-              <p:nvPicPr>
-                <p:cNvPr id="3" name="Graphic 2" descr="Paper">
-                  <a:extLst>
-                    <a:ext uri="{FF2B5EF4-FFF2-40B4-BE49-F238E27FC236}">
-                      <a16:creationId xmlns:a16="http://schemas.microsoft.com/office/drawing/2014/main" id="{57F09E79-2329-450F-B543-2C70D4404026}"/>
-                    </a:ext>
-                  </a:extLst>
-                </p:cNvPr>
-                <p:cNvPicPr>
-                  <a:picLocks noChangeAspect="1"/>
-                </p:cNvPicPr>
-                <p:nvPr/>
-              </p:nvPicPr>
-              <p:blipFill rotWithShape="1">
-                <a:blip r:embed="rId5">
-                  <a:extLst>
-                    <a:ext uri="{28A0092B-C50C-407E-A947-70E740481C1C}">
-                      <a14:useLocalDpi xmlns:a14="http://schemas.microsoft.com/office/drawing/2010/main" val="0"/>
-                    </a:ext>
-                    <a:ext uri="{96DAC541-7B7A-43D3-8B79-37D633B846F1}">
-                      <asvg:svgBlip xmlns:asvg="http://schemas.microsoft.com/office/drawing/2016/SVG/main" r:embed="rId6"/>
-                    </a:ext>
-                  </a:extLst>
-                </a:blip>
-                <a:srcRect l="14474" t="5386" r="15477" b="5745"/>
-                <a:stretch/>
-              </p:blipFill>
-              <p:spPr>
-                <a:xfrm>
-                  <a:off x="5769559" y="3519524"/>
-                  <a:ext cx="892674" cy="1132520"/>
-                </a:xfrm>
-                <a:prstGeom prst="rect">
-                  <a:avLst/>
-                </a:prstGeom>
-              </p:spPr>
-            </p:pic>
-            <p:sp>
-              <p:nvSpPr>
-                <p:cNvPr id="18" name="TextBox 17">
-                  <a:extLst>
-                    <a:ext uri="{FF2B5EF4-FFF2-40B4-BE49-F238E27FC236}">
-                      <a16:creationId xmlns:a16="http://schemas.microsoft.com/office/drawing/2014/main" id="{849D081C-36D1-4319-8021-9877B7B383FE}"/>
-                    </a:ext>
-                  </a:extLst>
-                </p:cNvPr>
-                <p:cNvSpPr txBox="1"/>
-                <p:nvPr/>
-              </p:nvSpPr>
-              <p:spPr>
-                <a:xfrm>
-                  <a:off x="5933607" y="3901326"/>
-                  <a:ext cx="564578" cy="646331"/>
-                </a:xfrm>
-                <a:prstGeom prst="rect">
-                  <a:avLst/>
-                </a:prstGeom>
-                <a:noFill/>
-              </p:spPr>
-              <p:txBody>
-                <a:bodyPr wrap="none" rtlCol="0">
-                  <a:spAutoFit/>
-                </a:bodyPr>
-                <a:lstStyle/>
-                <a:p>
-                  <a:pPr algn="ctr"/>
-                  <a:r>
-                    <a:rPr lang="en-US" dirty="0">
-                      <a:latin typeface="Consolas" panose="020B0609020204030204" pitchFamily="49" charset="0"/>
-                    </a:rPr>
-                    <a:t>200</a:t>
-                  </a:r>
-                </a:p>
-                <a:p>
-                  <a:pPr algn="ctr"/>
-                  <a:r>
-                    <a:rPr lang="en-US" dirty="0">
-                      <a:latin typeface="Consolas" panose="020B0609020204030204" pitchFamily="49" charset="0"/>
-                    </a:rPr>
-                    <a:t>OK</a:t>
-                  </a:r>
-                </a:p>
-              </p:txBody>
-            </p:sp>
-          </p:grpSp>
         </p:grpSp>
-        <p:sp>
-          <p:nvSpPr>
-            <p:cNvPr id="22" name="TextBox 21">
-              <a:extLst>
-                <a:ext uri="{FF2B5EF4-FFF2-40B4-BE49-F238E27FC236}">
-                  <a16:creationId xmlns:a16="http://schemas.microsoft.com/office/drawing/2014/main" id="{604C2119-7AF1-4924-B860-BCFCA637B90D}"/>
-                </a:ext>
-              </a:extLst>
-            </p:cNvPr>
-            <p:cNvSpPr txBox="1"/>
-            <p:nvPr/>
-          </p:nvSpPr>
-          <p:spPr>
-            <a:xfrm>
-              <a:off x="6928271" y="537657"/>
-              <a:ext cx="1397240" cy="830997"/>
-            </a:xfrm>
-            <a:prstGeom prst="rect">
-              <a:avLst/>
-            </a:prstGeom>
-            <a:solidFill>
-              <a:schemeClr val="dk1">
-                <a:alpha val="50000"/>
-              </a:schemeClr>
-            </a:solidFill>
-            <a:ln>
-              <a:noFill/>
-            </a:ln>
-          </p:spPr>
-          <p:style>
-            <a:lnRef idx="0">
-              <a:scrgbClr r="0" g="0" b="0"/>
-            </a:lnRef>
-            <a:fillRef idx="0">
-              <a:scrgbClr r="0" g="0" b="0"/>
-            </a:fillRef>
-            <a:effectRef idx="0">
-              <a:scrgbClr r="0" g="0" b="0"/>
-            </a:effectRef>
-            <a:fontRef idx="minor">
-              <a:schemeClr val="lt1"/>
-            </a:fontRef>
-          </p:style>
-          <p:txBody>
-            <a:bodyPr wrap="square" rtlCol="0">
-              <a:spAutoFit/>
-            </a:bodyPr>
-            <a:lstStyle/>
-            <a:p>
-              <a:r>
-                <a:rPr lang="en-US" sz="800" dirty="0">
-                  <a:latin typeface="Consolas" panose="020B0609020204030204" pitchFamily="49" charset="0"/>
-                </a:rPr>
-                <a:t>{</a:t>
-              </a:r>
-            </a:p>
-            <a:p>
-              <a:r>
-                <a:rPr lang="en-US" sz="800" dirty="0">
-                  <a:latin typeface="Consolas" panose="020B0609020204030204" pitchFamily="49" charset="0"/>
-                </a:rPr>
-                <a:t>  "task": "continue",</a:t>
-              </a:r>
-            </a:p>
-            <a:p>
-              <a:r>
-                <a:rPr lang="en-US" sz="800" dirty="0">
-                  <a:latin typeface="Consolas" panose="020B0609020204030204" pitchFamily="49" charset="0"/>
-                </a:rPr>
-                <a:t>  "value": {</a:t>
-              </a:r>
-            </a:p>
-            <a:p>
-              <a:r>
-                <a:rPr lang="en-US" sz="800" dirty="0">
-                  <a:latin typeface="Consolas" panose="020B0609020204030204" pitchFamily="49" charset="0"/>
-                </a:rPr>
-                <a:t>    &lt;</a:t>
-              </a:r>
-              <a:r>
-                <a:rPr lang="en-US" sz="800" dirty="0" err="1">
-                  <a:latin typeface="Consolas" panose="020B0609020204030204" pitchFamily="49" charset="0"/>
-                </a:rPr>
-                <a:t>TaskInfo</a:t>
-              </a:r>
-              <a:r>
-                <a:rPr lang="en-US" sz="800" dirty="0">
-                  <a:latin typeface="Consolas" panose="020B0609020204030204" pitchFamily="49" charset="0"/>
-                </a:rPr>
-                <a:t> object&gt;</a:t>
-              </a:r>
-            </a:p>
-            <a:p>
-              <a:r>
-                <a:rPr lang="en-US" sz="800" dirty="0">
-                  <a:latin typeface="Consolas" panose="020B0609020204030204" pitchFamily="49" charset="0"/>
-                </a:rPr>
-                <a:t>  }</a:t>
-              </a:r>
-            </a:p>
-            <a:p>
-              <a:r>
-                <a:rPr lang="en-US" sz="800" dirty="0">
-                  <a:latin typeface="Consolas" panose="020B0609020204030204" pitchFamily="49" charset="0"/>
-                </a:rPr>
-                <a:t>}</a:t>
-              </a:r>
-            </a:p>
-          </p:txBody>
-        </p:sp>
       </p:grpSp>
       <p:grpSp>
         <p:nvGrpSpPr>
@@ -4610,7 +4479,7 @@
         </p:nvGrpSpPr>
         <p:grpSpPr>
           <a:xfrm>
-            <a:off x="7238455" y="1569289"/>
+            <a:off x="8519873" y="1569289"/>
             <a:ext cx="2341917" cy="2433484"/>
             <a:chOff x="7730472" y="1606799"/>
             <a:chExt cx="2341917" cy="2433484"/>
@@ -4915,7 +4784,7 @@
         </p:blipFill>
         <p:spPr>
           <a:xfrm rot="10800000">
-            <a:off x="7009855" y="2347959"/>
+            <a:off x="8291273" y="2347959"/>
             <a:ext cx="457200" cy="457200"/>
           </a:xfrm>
           <a:prstGeom prst="rect">
@@ -4939,7 +4808,7 @@
         </p:nvSpPr>
         <p:spPr>
           <a:xfrm>
-            <a:off x="2660231" y="1042682"/>
+            <a:off x="2660231" y="1036265"/>
             <a:ext cx="274320" cy="274320"/>
           </a:xfrm>
           <a:prstGeom prst="ellipse">
@@ -4998,7 +4867,7 @@
         </p:nvSpPr>
         <p:spPr>
           <a:xfrm>
-            <a:off x="4644807" y="1042682"/>
+            <a:off x="4644807" y="1036265"/>
             <a:ext cx="274320" cy="274320"/>
           </a:xfrm>
           <a:prstGeom prst="ellipse">
@@ -5057,7 +4926,7 @@
         </p:nvSpPr>
         <p:spPr>
           <a:xfrm>
-            <a:off x="6175671" y="1042682"/>
+            <a:off x="6771255" y="1036265"/>
             <a:ext cx="274320" cy="274320"/>
           </a:xfrm>
           <a:prstGeom prst="ellipse">
@@ -5116,7 +4985,7 @@
         </p:nvSpPr>
         <p:spPr>
           <a:xfrm>
-            <a:off x="8399061" y="1042682"/>
+            <a:off x="9680479" y="1036265"/>
             <a:ext cx="274320" cy="274320"/>
           </a:xfrm>
           <a:prstGeom prst="ellipse">
@@ -5155,6 +5024,206 @@
             <a:r>
               <a:rPr lang="en-US" sz="1600" dirty="0"/>
               <a:t>4</a:t>
+            </a:r>
+          </a:p>
+        </p:txBody>
+      </p:sp>
+      <p:sp>
+        <p:nvSpPr>
+          <p:cNvPr id="22" name="TextBox 21">
+            <a:extLst>
+              <a:ext uri="{FF2B5EF4-FFF2-40B4-BE49-F238E27FC236}">
+                <a16:creationId xmlns:a16="http://schemas.microsoft.com/office/drawing/2014/main" id="{604C2119-7AF1-4924-B860-BCFCA637B90D}"/>
+              </a:ext>
+            </a:extLst>
+          </p:cNvPr>
+          <p:cNvSpPr txBox="1"/>
+          <p:nvPr/>
+        </p:nvSpPr>
+        <p:spPr>
+          <a:xfrm>
+            <a:off x="5598535" y="1834155"/>
+            <a:ext cx="2619911" cy="1446550"/>
+          </a:xfrm>
+          <a:prstGeom prst="rect">
+            <a:avLst/>
+          </a:prstGeom>
+          <a:solidFill>
+            <a:schemeClr val="dk1">
+              <a:alpha val="50000"/>
+            </a:schemeClr>
+          </a:solidFill>
+          <a:ln>
+            <a:noFill/>
+          </a:ln>
+        </p:spPr>
+        <p:style>
+          <a:lnRef idx="0">
+            <a:scrgbClr r="0" g="0" b="0"/>
+          </a:lnRef>
+          <a:fillRef idx="0">
+            <a:scrgbClr r="0" g="0" b="0"/>
+          </a:fillRef>
+          <a:effectRef idx="0">
+            <a:scrgbClr r="0" g="0" b="0"/>
+          </a:effectRef>
+          <a:fontRef idx="minor">
+            <a:schemeClr val="lt1"/>
+          </a:fontRef>
+        </p:style>
+        <p:txBody>
+          <a:bodyPr wrap="square" lIns="45720" rIns="45720" rtlCol="0">
+            <a:spAutoFit/>
+          </a:bodyPr>
+          <a:lstStyle>
+            <a:defPPr>
+              <a:defRPr lang="en-US"/>
+            </a:defPPr>
+            <a:lvl1pPr>
+              <a:defRPr sz="800">
+                <a:solidFill>
+                  <a:schemeClr val="lt1"/>
+                </a:solidFill>
+                <a:latin typeface="Consolas" panose="020B0609020204030204" pitchFamily="49" charset="0"/>
+              </a:defRPr>
+            </a:lvl1pPr>
+            <a:lvl2pPr>
+              <a:defRPr>
+                <a:solidFill>
+                  <a:schemeClr val="lt1"/>
+                </a:solidFill>
+              </a:defRPr>
+            </a:lvl2pPr>
+            <a:lvl3pPr>
+              <a:defRPr>
+                <a:solidFill>
+                  <a:schemeClr val="lt1"/>
+                </a:solidFill>
+              </a:defRPr>
+            </a:lvl3pPr>
+            <a:lvl4pPr>
+              <a:defRPr>
+                <a:solidFill>
+                  <a:schemeClr val="lt1"/>
+                </a:solidFill>
+              </a:defRPr>
+            </a:lvl4pPr>
+            <a:lvl5pPr>
+              <a:defRPr>
+                <a:solidFill>
+                  <a:schemeClr val="lt1"/>
+                </a:solidFill>
+              </a:defRPr>
+            </a:lvl5pPr>
+            <a:lvl6pPr>
+              <a:defRPr>
+                <a:solidFill>
+                  <a:schemeClr val="lt1"/>
+                </a:solidFill>
+              </a:defRPr>
+            </a:lvl6pPr>
+            <a:lvl7pPr>
+              <a:defRPr>
+                <a:solidFill>
+                  <a:schemeClr val="lt1"/>
+                </a:solidFill>
+              </a:defRPr>
+            </a:lvl7pPr>
+            <a:lvl8pPr>
+              <a:defRPr>
+                <a:solidFill>
+                  <a:schemeClr val="lt1"/>
+                </a:solidFill>
+              </a:defRPr>
+            </a:lvl8pPr>
+            <a:lvl9pPr>
+              <a:defRPr>
+                <a:solidFill>
+                  <a:schemeClr val="lt1"/>
+                </a:solidFill>
+              </a:defRPr>
+            </a:lvl9pPr>
+          </a:lstStyle>
+          <a:p>
+            <a:r>
+              <a:rPr lang="en-US" dirty="0"/>
+              <a:t>{</a:t>
+            </a:r>
+          </a:p>
+          <a:p>
+            <a:r>
+              <a:rPr lang="en-US" dirty="0"/>
+              <a:t>  "task": {</a:t>
+            </a:r>
+          </a:p>
+          <a:p>
+            <a:r>
+              <a:rPr lang="en-US" dirty="0"/>
+              <a:t>    "type": "continue",</a:t>
+            </a:r>
+          </a:p>
+          <a:p>
+            <a:r>
+              <a:rPr lang="en-US" dirty="0"/>
+              <a:t>    "value": {</a:t>
+            </a:r>
+          </a:p>
+          <a:p>
+            <a:r>
+              <a:rPr lang="en-US" dirty="0"/>
+              <a:t>      "title": "Lorem ipsum arcus </a:t>
+            </a:r>
+            <a:r>
+              <a:rPr lang="en-US" dirty="0" err="1"/>
+              <a:t>touchus</a:t>
+            </a:r>
+            <a:r>
+              <a:rPr lang="en-US" dirty="0"/>
+              <a:t>",</a:t>
+            </a:r>
+          </a:p>
+          <a:p>
+            <a:r>
+              <a:rPr lang="en-US" dirty="0"/>
+              <a:t>      "height": 600,</a:t>
+            </a:r>
+          </a:p>
+          <a:p>
+            <a:r>
+              <a:rPr lang="en-US" dirty="0"/>
+              <a:t>      "width": 400</a:t>
+            </a:r>
+          </a:p>
+          <a:p>
+            <a:r>
+              <a:rPr lang="en-US" dirty="0"/>
+              <a:t>      "</a:t>
+            </a:r>
+            <a:r>
+              <a:rPr lang="en-US" dirty="0" err="1"/>
+              <a:t>url</a:t>
+            </a:r>
+            <a:r>
+              <a:rPr lang="en-US" dirty="0"/>
+              <a:t>": "https://shopbot.com?item=90210"</a:t>
+            </a:r>
+          </a:p>
+          <a:p>
+            <a:r>
+              <a:rPr lang="en-US" dirty="0"/>
+              <a:t>    }</a:t>
+            </a:r>
+          </a:p>
+          <a:p>
+            <a:r>
+              <a:rPr lang="en-US" dirty="0"/>
+              <a:t>  }</a:t>
+            </a:r>
+          </a:p>
+          <a:p>
+            <a:r>
+              <a:rPr lang="en-US" dirty="0"/>
+              <a:t>}</a:t>
             </a:r>
           </a:p>
         </p:txBody>

</xml_diff>

<commit_message>
Task modules csharp examples (#275)
* Added C# sample and example code

* Fixed erroneous task/fetch content, updated C# source, minor cleanup

* Cleaned up formatting for deep link syntax
</commit_message>
<xml_diff>
--- a/msteams-platform/assets/images/task-module/Task Module Images.pptx
+++ b/msteams-platform/assets/images/task-module/Task Module Images.pptx
@@ -260,7 +260,7 @@
           <a:p>
             <a:fld id="{A7440465-2392-4494-A816-244CB43AFC7C}" type="datetimeFigureOut">
               <a:rPr lang="en-US" smtClean="0"/>
-              <a:t>9/5/2018</a:t>
+              <a:t>9/28/2018</a:t>
             </a:fld>
             <a:endParaRPr lang="en-US"/>
           </a:p>
@@ -458,7 +458,7 @@
           <a:p>
             <a:fld id="{A7440465-2392-4494-A816-244CB43AFC7C}" type="datetimeFigureOut">
               <a:rPr lang="en-US" smtClean="0"/>
-              <a:t>9/5/2018</a:t>
+              <a:t>9/28/2018</a:t>
             </a:fld>
             <a:endParaRPr lang="en-US"/>
           </a:p>
@@ -666,7 +666,7 @@
           <a:p>
             <a:fld id="{A7440465-2392-4494-A816-244CB43AFC7C}" type="datetimeFigureOut">
               <a:rPr lang="en-US" smtClean="0"/>
-              <a:t>9/5/2018</a:t>
+              <a:t>9/28/2018</a:t>
             </a:fld>
             <a:endParaRPr lang="en-US"/>
           </a:p>
@@ -864,7 +864,7 @@
           <a:p>
             <a:fld id="{A7440465-2392-4494-A816-244CB43AFC7C}" type="datetimeFigureOut">
               <a:rPr lang="en-US" smtClean="0"/>
-              <a:t>9/5/2018</a:t>
+              <a:t>9/28/2018</a:t>
             </a:fld>
             <a:endParaRPr lang="en-US"/>
           </a:p>
@@ -1139,7 +1139,7 @@
           <a:p>
             <a:fld id="{A7440465-2392-4494-A816-244CB43AFC7C}" type="datetimeFigureOut">
               <a:rPr lang="en-US" smtClean="0"/>
-              <a:t>9/5/2018</a:t>
+              <a:t>9/28/2018</a:t>
             </a:fld>
             <a:endParaRPr lang="en-US"/>
           </a:p>
@@ -1404,7 +1404,7 @@
           <a:p>
             <a:fld id="{A7440465-2392-4494-A816-244CB43AFC7C}" type="datetimeFigureOut">
               <a:rPr lang="en-US" smtClean="0"/>
-              <a:t>9/5/2018</a:t>
+              <a:t>9/28/2018</a:t>
             </a:fld>
             <a:endParaRPr lang="en-US"/>
           </a:p>
@@ -1816,7 +1816,7 @@
           <a:p>
             <a:fld id="{A7440465-2392-4494-A816-244CB43AFC7C}" type="datetimeFigureOut">
               <a:rPr lang="en-US" smtClean="0"/>
-              <a:t>9/5/2018</a:t>
+              <a:t>9/28/2018</a:t>
             </a:fld>
             <a:endParaRPr lang="en-US"/>
           </a:p>
@@ -1957,7 +1957,7 @@
           <a:p>
             <a:fld id="{A7440465-2392-4494-A816-244CB43AFC7C}" type="datetimeFigureOut">
               <a:rPr lang="en-US" smtClean="0"/>
-              <a:t>9/5/2018</a:t>
+              <a:t>9/28/2018</a:t>
             </a:fld>
             <a:endParaRPr lang="en-US"/>
           </a:p>
@@ -2070,7 +2070,7 @@
           <a:p>
             <a:fld id="{A7440465-2392-4494-A816-244CB43AFC7C}" type="datetimeFigureOut">
               <a:rPr lang="en-US" smtClean="0"/>
-              <a:t>9/5/2018</a:t>
+              <a:t>9/28/2018</a:t>
             </a:fld>
             <a:endParaRPr lang="en-US"/>
           </a:p>
@@ -2381,7 +2381,7 @@
           <a:p>
             <a:fld id="{A7440465-2392-4494-A816-244CB43AFC7C}" type="datetimeFigureOut">
               <a:rPr lang="en-US" smtClean="0"/>
-              <a:t>9/5/2018</a:t>
+              <a:t>9/28/2018</a:t>
             </a:fld>
             <a:endParaRPr lang="en-US"/>
           </a:p>
@@ -2669,7 +2669,7 @@
           <a:p>
             <a:fld id="{A7440465-2392-4494-A816-244CB43AFC7C}" type="datetimeFigureOut">
               <a:rPr lang="en-US" smtClean="0"/>
-              <a:t>9/5/2018</a:t>
+              <a:t>9/28/2018</a:t>
             </a:fld>
             <a:endParaRPr lang="en-US"/>
           </a:p>
@@ -2910,7 +2910,7 @@
           <a:p>
             <a:fld id="{A7440465-2392-4494-A816-244CB43AFC7C}" type="datetimeFigureOut">
               <a:rPr lang="en-US" smtClean="0"/>
-              <a:t>9/5/2018</a:t>
+              <a:t>9/28/2018</a:t>
             </a:fld>
             <a:endParaRPr lang="en-US"/>
           </a:p>
@@ -4102,7 +4102,7 @@
           </a:fontRef>
         </p:style>
         <p:txBody>
-          <a:bodyPr wrap="square" rtlCol="0">
+          <a:bodyPr wrap="square" lIns="45720" rIns="45720" rtlCol="0">
             <a:spAutoFit/>
           </a:bodyPr>
           <a:lstStyle/>
@@ -4297,10 +4297,10 @@
       </p:pic>
       <p:grpSp>
         <p:nvGrpSpPr>
-          <p:cNvPr id="28" name="Group 27">
-            <a:extLst>
-              <a:ext uri="{FF2B5EF4-FFF2-40B4-BE49-F238E27FC236}">
-                <a16:creationId xmlns:a16="http://schemas.microsoft.com/office/drawing/2014/main" id="{E4B12A82-C5CA-485B-9B20-FA00D3CC56F4}"/>
+          <p:cNvPr id="23" name="Group 22">
+            <a:extLst>
+              <a:ext uri="{FF2B5EF4-FFF2-40B4-BE49-F238E27FC236}">
+                <a16:creationId xmlns:a16="http://schemas.microsoft.com/office/drawing/2014/main" id="{2347E812-0894-431E-B3DB-9C4298A510F8}"/>
               </a:ext>
             </a:extLst>
           </p:cNvPr>
@@ -4309,18 +4309,61 @@
         </p:nvGrpSpPr>
         <p:grpSpPr>
           <a:xfrm>
-            <a:off x="5568491" y="2161061"/>
-            <a:ext cx="1397240" cy="2535877"/>
-            <a:chOff x="6928271" y="537657"/>
-            <a:chExt cx="1397240" cy="2535877"/>
+            <a:off x="6474691" y="3452439"/>
+            <a:ext cx="867006" cy="1502402"/>
+            <a:chOff x="5172460" y="4140199"/>
+            <a:chExt cx="867006" cy="1502402"/>
           </a:xfrm>
         </p:grpSpPr>
+        <p:sp>
+          <p:nvSpPr>
+            <p:cNvPr id="17" name="TextBox 16">
+              <a:extLst>
+                <a:ext uri="{FF2B5EF4-FFF2-40B4-BE49-F238E27FC236}">
+                  <a16:creationId xmlns:a16="http://schemas.microsoft.com/office/drawing/2014/main" id="{184802C8-9C0F-46A4-B2A6-EB11FCBCF1D1}"/>
+                </a:ext>
+              </a:extLst>
+            </p:cNvPr>
+            <p:cNvSpPr txBox="1"/>
+            <p:nvPr/>
+          </p:nvSpPr>
+          <p:spPr>
+            <a:xfrm>
+              <a:off x="5233906" y="5211714"/>
+              <a:ext cx="744114" cy="430887"/>
+            </a:xfrm>
+            <a:prstGeom prst="rect">
+              <a:avLst/>
+            </a:prstGeom>
+            <a:noFill/>
+          </p:spPr>
+          <p:txBody>
+            <a:bodyPr wrap="none" rtlCol="0">
+              <a:spAutoFit/>
+            </a:bodyPr>
+            <a:lstStyle/>
+            <a:p>
+              <a:pPr algn="ctr"/>
+              <a:r>
+                <a:rPr lang="en-US" sz="1100" b="1" dirty="0"/>
+                <a:t>HTTP</a:t>
+              </a:r>
+            </a:p>
+            <a:p>
+              <a:pPr algn="ctr"/>
+              <a:r>
+                <a:rPr lang="en-US" sz="1100" b="1" dirty="0"/>
+                <a:t>Response</a:t>
+              </a:r>
+            </a:p>
+          </p:txBody>
+        </p:sp>
         <p:grpSp>
           <p:nvGrpSpPr>
-            <p:cNvPr id="23" name="Group 22">
+            <p:cNvPr id="19" name="Group 18">
               <a:extLst>
                 <a:ext uri="{FF2B5EF4-FFF2-40B4-BE49-F238E27FC236}">
-                  <a16:creationId xmlns:a16="http://schemas.microsoft.com/office/drawing/2014/main" id="{2347E812-0894-431E-B3DB-9C4298A510F8}"/>
+                  <a16:creationId xmlns:a16="http://schemas.microsoft.com/office/drawing/2014/main" id="{5FF23D1D-84F1-4E59-8BD1-2AE31795BD0E}"/>
                 </a:ext>
               </a:extLst>
             </p:cNvPr>
@@ -4329,18 +4372,56 @@
           </p:nvGrpSpPr>
           <p:grpSpPr>
             <a:xfrm>
-              <a:off x="7193388" y="1571132"/>
-              <a:ext cx="867006" cy="1502402"/>
-              <a:chOff x="5172460" y="4140199"/>
-              <a:chExt cx="867006" cy="1502402"/>
+              <a:off x="5172460" y="4140199"/>
+              <a:ext cx="867006" cy="1117388"/>
+              <a:chOff x="5769559" y="3519524"/>
+              <a:chExt cx="892674" cy="1132520"/>
             </a:xfrm>
           </p:grpSpPr>
+          <p:pic>
+            <p:nvPicPr>
+              <p:cNvPr id="3" name="Graphic 2" descr="Paper">
+                <a:extLst>
+                  <a:ext uri="{FF2B5EF4-FFF2-40B4-BE49-F238E27FC236}">
+                    <a16:creationId xmlns:a16="http://schemas.microsoft.com/office/drawing/2014/main" id="{57F09E79-2329-450F-B543-2C70D4404026}"/>
+                  </a:ext>
+                </a:extLst>
+              </p:cNvPr>
+              <p:cNvPicPr>
+                <a:picLocks noChangeAspect="1"/>
+              </p:cNvPicPr>
+              <p:nvPr/>
+            </p:nvPicPr>
+            <p:blipFill rotWithShape="1">
+              <a:blip r:embed="rId5">
+                <a:extLst>
+                  <a:ext uri="{28A0092B-C50C-407E-A947-70E740481C1C}">
+                    <a14:useLocalDpi xmlns:a14="http://schemas.microsoft.com/office/drawing/2010/main" val="0"/>
+                  </a:ext>
+                  <a:ext uri="{96DAC541-7B7A-43D3-8B79-37D633B846F1}">
+                    <asvg:svgBlip xmlns:asvg="http://schemas.microsoft.com/office/drawing/2016/SVG/main" r:embed="rId6"/>
+                  </a:ext>
+                </a:extLst>
+              </a:blip>
+              <a:srcRect l="14474" t="5386" r="15477" b="5745"/>
+              <a:stretch/>
+            </p:blipFill>
+            <p:spPr>
+              <a:xfrm>
+                <a:off x="5769559" y="3519524"/>
+                <a:ext cx="892674" cy="1132520"/>
+              </a:xfrm>
+              <a:prstGeom prst="rect">
+                <a:avLst/>
+              </a:prstGeom>
+            </p:spPr>
+          </p:pic>
           <p:sp>
             <p:nvSpPr>
-              <p:cNvPr id="17" name="TextBox 16">
+              <p:cNvPr id="18" name="TextBox 17">
                 <a:extLst>
                   <a:ext uri="{FF2B5EF4-FFF2-40B4-BE49-F238E27FC236}">
-                    <a16:creationId xmlns:a16="http://schemas.microsoft.com/office/drawing/2014/main" id="{184802C8-9C0F-46A4-B2A6-EB11FCBCF1D1}"/>
+                    <a16:creationId xmlns:a16="http://schemas.microsoft.com/office/drawing/2014/main" id="{849D081C-36D1-4319-8021-9877B7B383FE}"/>
                   </a:ext>
                 </a:extLst>
               </p:cNvPr>
@@ -4349,8 +4430,8 @@
             </p:nvSpPr>
             <p:spPr>
               <a:xfrm>
-                <a:off x="5233906" y="5211714"/>
-                <a:ext cx="744114" cy="430887"/>
+                <a:off x="5933607" y="3901326"/>
+                <a:ext cx="564578" cy="646331"/>
               </a:xfrm>
               <a:prstGeom prst="rect">
                 <a:avLst/>
@@ -4365,236 +4446,24 @@
               <a:p>
                 <a:pPr algn="ctr"/>
                 <a:r>
-                  <a:rPr lang="en-US" sz="1100" b="1" dirty="0"/>
-                  <a:t>HTTP</a:t>
+                  <a:rPr lang="en-US" dirty="0">
+                    <a:latin typeface="Consolas" panose="020B0609020204030204" pitchFamily="49" charset="0"/>
+                  </a:rPr>
+                  <a:t>200</a:t>
                 </a:r>
               </a:p>
               <a:p>
                 <a:pPr algn="ctr"/>
                 <a:r>
-                  <a:rPr lang="en-US" sz="1100" b="1" dirty="0"/>
-                  <a:t>Response</a:t>
+                  <a:rPr lang="en-US" dirty="0">
+                    <a:latin typeface="Consolas" panose="020B0609020204030204" pitchFamily="49" charset="0"/>
+                  </a:rPr>
+                  <a:t>OK</a:t>
                 </a:r>
               </a:p>
             </p:txBody>
           </p:sp>
-          <p:grpSp>
-            <p:nvGrpSpPr>
-              <p:cNvPr id="19" name="Group 18">
-                <a:extLst>
-                  <a:ext uri="{FF2B5EF4-FFF2-40B4-BE49-F238E27FC236}">
-                    <a16:creationId xmlns:a16="http://schemas.microsoft.com/office/drawing/2014/main" id="{5FF23D1D-84F1-4E59-8BD1-2AE31795BD0E}"/>
-                  </a:ext>
-                </a:extLst>
-              </p:cNvPr>
-              <p:cNvGrpSpPr/>
-              <p:nvPr/>
-            </p:nvGrpSpPr>
-            <p:grpSpPr>
-              <a:xfrm>
-                <a:off x="5172460" y="4140199"/>
-                <a:ext cx="867006" cy="1117388"/>
-                <a:chOff x="5769559" y="3519524"/>
-                <a:chExt cx="892674" cy="1132520"/>
-              </a:xfrm>
-            </p:grpSpPr>
-            <p:pic>
-              <p:nvPicPr>
-                <p:cNvPr id="3" name="Graphic 2" descr="Paper">
-                  <a:extLst>
-                    <a:ext uri="{FF2B5EF4-FFF2-40B4-BE49-F238E27FC236}">
-                      <a16:creationId xmlns:a16="http://schemas.microsoft.com/office/drawing/2014/main" id="{57F09E79-2329-450F-B543-2C70D4404026}"/>
-                    </a:ext>
-                  </a:extLst>
-                </p:cNvPr>
-                <p:cNvPicPr>
-                  <a:picLocks noChangeAspect="1"/>
-                </p:cNvPicPr>
-                <p:nvPr/>
-              </p:nvPicPr>
-              <p:blipFill rotWithShape="1">
-                <a:blip r:embed="rId5">
-                  <a:extLst>
-                    <a:ext uri="{28A0092B-C50C-407E-A947-70E740481C1C}">
-                      <a14:useLocalDpi xmlns:a14="http://schemas.microsoft.com/office/drawing/2010/main" val="0"/>
-                    </a:ext>
-                    <a:ext uri="{96DAC541-7B7A-43D3-8B79-37D633B846F1}">
-                      <asvg:svgBlip xmlns:asvg="http://schemas.microsoft.com/office/drawing/2016/SVG/main" r:embed="rId6"/>
-                    </a:ext>
-                  </a:extLst>
-                </a:blip>
-                <a:srcRect l="14474" t="5386" r="15477" b="5745"/>
-                <a:stretch/>
-              </p:blipFill>
-              <p:spPr>
-                <a:xfrm>
-                  <a:off x="5769559" y="3519524"/>
-                  <a:ext cx="892674" cy="1132520"/>
-                </a:xfrm>
-                <a:prstGeom prst="rect">
-                  <a:avLst/>
-                </a:prstGeom>
-              </p:spPr>
-            </p:pic>
-            <p:sp>
-              <p:nvSpPr>
-                <p:cNvPr id="18" name="TextBox 17">
-                  <a:extLst>
-                    <a:ext uri="{FF2B5EF4-FFF2-40B4-BE49-F238E27FC236}">
-                      <a16:creationId xmlns:a16="http://schemas.microsoft.com/office/drawing/2014/main" id="{849D081C-36D1-4319-8021-9877B7B383FE}"/>
-                    </a:ext>
-                  </a:extLst>
-                </p:cNvPr>
-                <p:cNvSpPr txBox="1"/>
-                <p:nvPr/>
-              </p:nvSpPr>
-              <p:spPr>
-                <a:xfrm>
-                  <a:off x="5933607" y="3901326"/>
-                  <a:ext cx="564578" cy="646331"/>
-                </a:xfrm>
-                <a:prstGeom prst="rect">
-                  <a:avLst/>
-                </a:prstGeom>
-                <a:noFill/>
-              </p:spPr>
-              <p:txBody>
-                <a:bodyPr wrap="none" rtlCol="0">
-                  <a:spAutoFit/>
-                </a:bodyPr>
-                <a:lstStyle/>
-                <a:p>
-                  <a:pPr algn="ctr"/>
-                  <a:r>
-                    <a:rPr lang="en-US" dirty="0">
-                      <a:latin typeface="Consolas" panose="020B0609020204030204" pitchFamily="49" charset="0"/>
-                    </a:rPr>
-                    <a:t>200</a:t>
-                  </a:r>
-                </a:p>
-                <a:p>
-                  <a:pPr algn="ctr"/>
-                  <a:r>
-                    <a:rPr lang="en-US" dirty="0">
-                      <a:latin typeface="Consolas" panose="020B0609020204030204" pitchFamily="49" charset="0"/>
-                    </a:rPr>
-                    <a:t>OK</a:t>
-                  </a:r>
-                </a:p>
-              </p:txBody>
-            </p:sp>
-          </p:grpSp>
         </p:grpSp>
-        <p:sp>
-          <p:nvSpPr>
-            <p:cNvPr id="22" name="TextBox 21">
-              <a:extLst>
-                <a:ext uri="{FF2B5EF4-FFF2-40B4-BE49-F238E27FC236}">
-                  <a16:creationId xmlns:a16="http://schemas.microsoft.com/office/drawing/2014/main" id="{604C2119-7AF1-4924-B860-BCFCA637B90D}"/>
-                </a:ext>
-              </a:extLst>
-            </p:cNvPr>
-            <p:cNvSpPr txBox="1"/>
-            <p:nvPr/>
-          </p:nvSpPr>
-          <p:spPr>
-            <a:xfrm>
-              <a:off x="6928271" y="537657"/>
-              <a:ext cx="1397240" cy="830997"/>
-            </a:xfrm>
-            <a:prstGeom prst="rect">
-              <a:avLst/>
-            </a:prstGeom>
-            <a:solidFill>
-              <a:schemeClr val="dk1">
-                <a:alpha val="50000"/>
-              </a:schemeClr>
-            </a:solidFill>
-            <a:ln>
-              <a:noFill/>
-            </a:ln>
-          </p:spPr>
-          <p:style>
-            <a:lnRef idx="0">
-              <a:scrgbClr r="0" g="0" b="0"/>
-            </a:lnRef>
-            <a:fillRef idx="0">
-              <a:scrgbClr r="0" g="0" b="0"/>
-            </a:fillRef>
-            <a:effectRef idx="0">
-              <a:scrgbClr r="0" g="0" b="0"/>
-            </a:effectRef>
-            <a:fontRef idx="minor">
-              <a:schemeClr val="lt1"/>
-            </a:fontRef>
-          </p:style>
-          <p:txBody>
-            <a:bodyPr wrap="square" rtlCol="0">
-              <a:spAutoFit/>
-            </a:bodyPr>
-            <a:lstStyle/>
-            <a:p>
-              <a:r>
-                <a:rPr lang="en-US" sz="800" dirty="0">
-                  <a:latin typeface="Consolas" panose="020B0609020204030204" pitchFamily="49" charset="0"/>
-                </a:rPr>
-                <a:t>{</a:t>
-              </a:r>
-            </a:p>
-            <a:p>
-              <a:r>
-                <a:rPr lang="en-US" sz="800" dirty="0">
-                  <a:latin typeface="Consolas" panose="020B0609020204030204" pitchFamily="49" charset="0"/>
-                </a:rPr>
-                <a:t>  "task": "continue",</a:t>
-              </a:r>
-            </a:p>
-            <a:p>
-              <a:r>
-                <a:rPr lang="en-US" sz="800" dirty="0">
-                  <a:latin typeface="Consolas" panose="020B0609020204030204" pitchFamily="49" charset="0"/>
-                </a:rPr>
-                <a:t>  "value": {</a:t>
-              </a:r>
-            </a:p>
-            <a:p>
-              <a:r>
-                <a:rPr lang="en-US" sz="800" dirty="0">
-                  <a:latin typeface="Consolas" panose="020B0609020204030204" pitchFamily="49" charset="0"/>
-                </a:rPr>
-                <a:t>    &lt;</a:t>
-              </a:r>
-              <a:r>
-                <a:rPr lang="en-US" sz="800" dirty="0" err="1">
-                  <a:latin typeface="Consolas" panose="020B0609020204030204" pitchFamily="49" charset="0"/>
-                </a:rPr>
-                <a:t>TaskInfo</a:t>
-              </a:r>
-              <a:r>
-                <a:rPr lang="en-US" sz="800" dirty="0">
-                  <a:latin typeface="Consolas" panose="020B0609020204030204" pitchFamily="49" charset="0"/>
-                </a:rPr>
-                <a:t> object&gt;</a:t>
-              </a:r>
-            </a:p>
-            <a:p>
-              <a:r>
-                <a:rPr lang="en-US" sz="800" dirty="0">
-                  <a:latin typeface="Consolas" panose="020B0609020204030204" pitchFamily="49" charset="0"/>
-                </a:rPr>
-                <a:t>  }</a:t>
-              </a:r>
-            </a:p>
-            <a:p>
-              <a:r>
-                <a:rPr lang="en-US" sz="800" dirty="0">
-                  <a:latin typeface="Consolas" panose="020B0609020204030204" pitchFamily="49" charset="0"/>
-                </a:rPr>
-                <a:t>}</a:t>
-              </a:r>
-            </a:p>
-          </p:txBody>
-        </p:sp>
       </p:grpSp>
       <p:grpSp>
         <p:nvGrpSpPr>
@@ -4610,7 +4479,7 @@
         </p:nvGrpSpPr>
         <p:grpSpPr>
           <a:xfrm>
-            <a:off x="7238455" y="1569289"/>
+            <a:off x="8519873" y="1569289"/>
             <a:ext cx="2341917" cy="2433484"/>
             <a:chOff x="7730472" y="1606799"/>
             <a:chExt cx="2341917" cy="2433484"/>
@@ -4915,7 +4784,7 @@
         </p:blipFill>
         <p:spPr>
           <a:xfrm rot="10800000">
-            <a:off x="7009855" y="2347959"/>
+            <a:off x="8291273" y="2347959"/>
             <a:ext cx="457200" cy="457200"/>
           </a:xfrm>
           <a:prstGeom prst="rect">
@@ -4939,7 +4808,7 @@
         </p:nvSpPr>
         <p:spPr>
           <a:xfrm>
-            <a:off x="2660231" y="1042682"/>
+            <a:off x="2660231" y="1036265"/>
             <a:ext cx="274320" cy="274320"/>
           </a:xfrm>
           <a:prstGeom prst="ellipse">
@@ -4998,7 +4867,7 @@
         </p:nvSpPr>
         <p:spPr>
           <a:xfrm>
-            <a:off x="4644807" y="1042682"/>
+            <a:off x="4644807" y="1036265"/>
             <a:ext cx="274320" cy="274320"/>
           </a:xfrm>
           <a:prstGeom prst="ellipse">
@@ -5057,7 +4926,7 @@
         </p:nvSpPr>
         <p:spPr>
           <a:xfrm>
-            <a:off x="6175671" y="1042682"/>
+            <a:off x="6771255" y="1036265"/>
             <a:ext cx="274320" cy="274320"/>
           </a:xfrm>
           <a:prstGeom prst="ellipse">
@@ -5116,7 +4985,7 @@
         </p:nvSpPr>
         <p:spPr>
           <a:xfrm>
-            <a:off x="8399061" y="1042682"/>
+            <a:off x="9680479" y="1036265"/>
             <a:ext cx="274320" cy="274320"/>
           </a:xfrm>
           <a:prstGeom prst="ellipse">
@@ -5155,6 +5024,206 @@
             <a:r>
               <a:rPr lang="en-US" sz="1600" dirty="0"/>
               <a:t>4</a:t>
+            </a:r>
+          </a:p>
+        </p:txBody>
+      </p:sp>
+      <p:sp>
+        <p:nvSpPr>
+          <p:cNvPr id="22" name="TextBox 21">
+            <a:extLst>
+              <a:ext uri="{FF2B5EF4-FFF2-40B4-BE49-F238E27FC236}">
+                <a16:creationId xmlns:a16="http://schemas.microsoft.com/office/drawing/2014/main" id="{604C2119-7AF1-4924-B860-BCFCA637B90D}"/>
+              </a:ext>
+            </a:extLst>
+          </p:cNvPr>
+          <p:cNvSpPr txBox="1"/>
+          <p:nvPr/>
+        </p:nvSpPr>
+        <p:spPr>
+          <a:xfrm>
+            <a:off x="5598535" y="1834155"/>
+            <a:ext cx="2619911" cy="1446550"/>
+          </a:xfrm>
+          <a:prstGeom prst="rect">
+            <a:avLst/>
+          </a:prstGeom>
+          <a:solidFill>
+            <a:schemeClr val="dk1">
+              <a:alpha val="50000"/>
+            </a:schemeClr>
+          </a:solidFill>
+          <a:ln>
+            <a:noFill/>
+          </a:ln>
+        </p:spPr>
+        <p:style>
+          <a:lnRef idx="0">
+            <a:scrgbClr r="0" g="0" b="0"/>
+          </a:lnRef>
+          <a:fillRef idx="0">
+            <a:scrgbClr r="0" g="0" b="0"/>
+          </a:fillRef>
+          <a:effectRef idx="0">
+            <a:scrgbClr r="0" g="0" b="0"/>
+          </a:effectRef>
+          <a:fontRef idx="minor">
+            <a:schemeClr val="lt1"/>
+          </a:fontRef>
+        </p:style>
+        <p:txBody>
+          <a:bodyPr wrap="square" lIns="45720" rIns="45720" rtlCol="0">
+            <a:spAutoFit/>
+          </a:bodyPr>
+          <a:lstStyle>
+            <a:defPPr>
+              <a:defRPr lang="en-US"/>
+            </a:defPPr>
+            <a:lvl1pPr>
+              <a:defRPr sz="800">
+                <a:solidFill>
+                  <a:schemeClr val="lt1"/>
+                </a:solidFill>
+                <a:latin typeface="Consolas" panose="020B0609020204030204" pitchFamily="49" charset="0"/>
+              </a:defRPr>
+            </a:lvl1pPr>
+            <a:lvl2pPr>
+              <a:defRPr>
+                <a:solidFill>
+                  <a:schemeClr val="lt1"/>
+                </a:solidFill>
+              </a:defRPr>
+            </a:lvl2pPr>
+            <a:lvl3pPr>
+              <a:defRPr>
+                <a:solidFill>
+                  <a:schemeClr val="lt1"/>
+                </a:solidFill>
+              </a:defRPr>
+            </a:lvl3pPr>
+            <a:lvl4pPr>
+              <a:defRPr>
+                <a:solidFill>
+                  <a:schemeClr val="lt1"/>
+                </a:solidFill>
+              </a:defRPr>
+            </a:lvl4pPr>
+            <a:lvl5pPr>
+              <a:defRPr>
+                <a:solidFill>
+                  <a:schemeClr val="lt1"/>
+                </a:solidFill>
+              </a:defRPr>
+            </a:lvl5pPr>
+            <a:lvl6pPr>
+              <a:defRPr>
+                <a:solidFill>
+                  <a:schemeClr val="lt1"/>
+                </a:solidFill>
+              </a:defRPr>
+            </a:lvl6pPr>
+            <a:lvl7pPr>
+              <a:defRPr>
+                <a:solidFill>
+                  <a:schemeClr val="lt1"/>
+                </a:solidFill>
+              </a:defRPr>
+            </a:lvl7pPr>
+            <a:lvl8pPr>
+              <a:defRPr>
+                <a:solidFill>
+                  <a:schemeClr val="lt1"/>
+                </a:solidFill>
+              </a:defRPr>
+            </a:lvl8pPr>
+            <a:lvl9pPr>
+              <a:defRPr>
+                <a:solidFill>
+                  <a:schemeClr val="lt1"/>
+                </a:solidFill>
+              </a:defRPr>
+            </a:lvl9pPr>
+          </a:lstStyle>
+          <a:p>
+            <a:r>
+              <a:rPr lang="en-US" dirty="0"/>
+              <a:t>{</a:t>
+            </a:r>
+          </a:p>
+          <a:p>
+            <a:r>
+              <a:rPr lang="en-US" dirty="0"/>
+              <a:t>  "task": {</a:t>
+            </a:r>
+          </a:p>
+          <a:p>
+            <a:r>
+              <a:rPr lang="en-US" dirty="0"/>
+              <a:t>    "type": "continue",</a:t>
+            </a:r>
+          </a:p>
+          <a:p>
+            <a:r>
+              <a:rPr lang="en-US" dirty="0"/>
+              <a:t>    "value": {</a:t>
+            </a:r>
+          </a:p>
+          <a:p>
+            <a:r>
+              <a:rPr lang="en-US" dirty="0"/>
+              <a:t>      "title": "Lorem ipsum arcus </a:t>
+            </a:r>
+            <a:r>
+              <a:rPr lang="en-US" dirty="0" err="1"/>
+              <a:t>touchus</a:t>
+            </a:r>
+            <a:r>
+              <a:rPr lang="en-US" dirty="0"/>
+              <a:t>",</a:t>
+            </a:r>
+          </a:p>
+          <a:p>
+            <a:r>
+              <a:rPr lang="en-US" dirty="0"/>
+              <a:t>      "height": 600,</a:t>
+            </a:r>
+          </a:p>
+          <a:p>
+            <a:r>
+              <a:rPr lang="en-US" dirty="0"/>
+              <a:t>      "width": 400</a:t>
+            </a:r>
+          </a:p>
+          <a:p>
+            <a:r>
+              <a:rPr lang="en-US" dirty="0"/>
+              <a:t>      "</a:t>
+            </a:r>
+            <a:r>
+              <a:rPr lang="en-US" dirty="0" err="1"/>
+              <a:t>url</a:t>
+            </a:r>
+            <a:r>
+              <a:rPr lang="en-US" dirty="0"/>
+              <a:t>": "https://shopbot.com?item=90210"</a:t>
+            </a:r>
+          </a:p>
+          <a:p>
+            <a:r>
+              <a:rPr lang="en-US" dirty="0"/>
+              <a:t>    }</a:t>
+            </a:r>
+          </a:p>
+          <a:p>
+            <a:r>
+              <a:rPr lang="en-US" dirty="0"/>
+              <a:t>  }</a:t>
+            </a:r>
+          </a:p>
+          <a:p>
+            <a:r>
+              <a:rPr lang="en-US" dirty="0"/>
+              <a:t>}</a:t>
             </a:r>
           </a:p>
         </p:txBody>

</xml_diff>